<commit_message>
errores en la clase 2
</commit_message>
<xml_diff>
--- a/Sesion_2/Clase2_HTML.pptx
+++ b/Sesion_2/Clase2_HTML.pptx
@@ -8,10 +8,10 @@
     <p:sldId id="256" r:id="rId2"/>
     <p:sldId id="261" r:id="rId3"/>
     <p:sldId id="257" r:id="rId4"/>
-    <p:sldId id="263" r:id="rId5"/>
-    <p:sldId id="266" r:id="rId6"/>
-    <p:sldId id="264" r:id="rId7"/>
-    <p:sldId id="265" r:id="rId8"/>
+    <p:sldId id="260" r:id="rId5"/>
+    <p:sldId id="258" r:id="rId6"/>
+    <p:sldId id="259" r:id="rId7"/>
+    <p:sldId id="262" r:id="rId8"/>
   </p:sldIdLst>
   <p:sldSz cx="9144000" cy="6858000" type="screen4x3"/>
   <p:notesSz cx="6858000" cy="9144000"/>
@@ -310,7 +310,7 @@
           <a:p>
             <a:fld id="{DBEE0CF6-0569-4550-B7F9-35164B80ED23}" type="datetimeFigureOut">
               <a:rPr lang="es-BO" smtClean="0"/>
-              <a:t>9/4/2019</a:t>
+              <a:t>05/04/2019</a:t>
             </a:fld>
             <a:endParaRPr lang="es-BO"/>
           </a:p>
@@ -352,7 +352,7 @@
           <a:p>
             <a:fld id="{EB13234A-3D8F-46E3-8754-5FA83D64FA90}" type="slidenum">
               <a:rPr lang="es-BO" smtClean="0"/>
-              <a:t>‹#›</a:t>
+              <a:t>‹Nº›</a:t>
             </a:fld>
             <a:endParaRPr lang="es-BO"/>
           </a:p>
@@ -480,7 +480,7 @@
           <a:p>
             <a:fld id="{DBEE0CF6-0569-4550-B7F9-35164B80ED23}" type="datetimeFigureOut">
               <a:rPr lang="es-BO" smtClean="0"/>
-              <a:t>9/4/2019</a:t>
+              <a:t>05/04/2019</a:t>
             </a:fld>
             <a:endParaRPr lang="es-BO"/>
           </a:p>
@@ -522,7 +522,7 @@
           <a:p>
             <a:fld id="{EB13234A-3D8F-46E3-8754-5FA83D64FA90}" type="slidenum">
               <a:rPr lang="es-BO" smtClean="0"/>
-              <a:t>‹#›</a:t>
+              <a:t>‹Nº›</a:t>
             </a:fld>
             <a:endParaRPr lang="es-BO"/>
           </a:p>
@@ -660,7 +660,7 @@
           <a:p>
             <a:fld id="{DBEE0CF6-0569-4550-B7F9-35164B80ED23}" type="datetimeFigureOut">
               <a:rPr lang="es-BO" smtClean="0"/>
-              <a:t>9/4/2019</a:t>
+              <a:t>05/04/2019</a:t>
             </a:fld>
             <a:endParaRPr lang="es-BO"/>
           </a:p>
@@ -702,7 +702,7 @@
           <a:p>
             <a:fld id="{EB13234A-3D8F-46E3-8754-5FA83D64FA90}" type="slidenum">
               <a:rPr lang="es-BO" smtClean="0"/>
-              <a:t>‹#›</a:t>
+              <a:t>‹Nº›</a:t>
             </a:fld>
             <a:endParaRPr lang="es-BO"/>
           </a:p>
@@ -830,7 +830,7 @@
           <a:p>
             <a:fld id="{DBEE0CF6-0569-4550-B7F9-35164B80ED23}" type="datetimeFigureOut">
               <a:rPr lang="es-BO" smtClean="0"/>
-              <a:t>9/4/2019</a:t>
+              <a:t>05/04/2019</a:t>
             </a:fld>
             <a:endParaRPr lang="es-BO"/>
           </a:p>
@@ -872,7 +872,7 @@
           <a:p>
             <a:fld id="{EB13234A-3D8F-46E3-8754-5FA83D64FA90}" type="slidenum">
               <a:rPr lang="es-BO" smtClean="0"/>
-              <a:t>‹#›</a:t>
+              <a:t>‹Nº›</a:t>
             </a:fld>
             <a:endParaRPr lang="es-BO"/>
           </a:p>
@@ -1076,7 +1076,7 @@
           <a:p>
             <a:fld id="{DBEE0CF6-0569-4550-B7F9-35164B80ED23}" type="datetimeFigureOut">
               <a:rPr lang="es-BO" smtClean="0"/>
-              <a:t>9/4/2019</a:t>
+              <a:t>05/04/2019</a:t>
             </a:fld>
             <a:endParaRPr lang="es-BO"/>
           </a:p>
@@ -1118,7 +1118,7 @@
           <a:p>
             <a:fld id="{EB13234A-3D8F-46E3-8754-5FA83D64FA90}" type="slidenum">
               <a:rPr lang="es-BO" smtClean="0"/>
-              <a:t>‹#›</a:t>
+              <a:t>‹Nº›</a:t>
             </a:fld>
             <a:endParaRPr lang="es-BO"/>
           </a:p>
@@ -1364,7 +1364,7 @@
           <a:p>
             <a:fld id="{DBEE0CF6-0569-4550-B7F9-35164B80ED23}" type="datetimeFigureOut">
               <a:rPr lang="es-BO" smtClean="0"/>
-              <a:t>9/4/2019</a:t>
+              <a:t>05/04/2019</a:t>
             </a:fld>
             <a:endParaRPr lang="es-BO"/>
           </a:p>
@@ -1406,7 +1406,7 @@
           <a:p>
             <a:fld id="{EB13234A-3D8F-46E3-8754-5FA83D64FA90}" type="slidenum">
               <a:rPr lang="es-BO" smtClean="0"/>
-              <a:t>‹#›</a:t>
+              <a:t>‹Nº›</a:t>
             </a:fld>
             <a:endParaRPr lang="es-BO"/>
           </a:p>
@@ -1786,7 +1786,7 @@
           <a:p>
             <a:fld id="{DBEE0CF6-0569-4550-B7F9-35164B80ED23}" type="datetimeFigureOut">
               <a:rPr lang="es-BO" smtClean="0"/>
-              <a:t>9/4/2019</a:t>
+              <a:t>05/04/2019</a:t>
             </a:fld>
             <a:endParaRPr lang="es-BO"/>
           </a:p>
@@ -1828,7 +1828,7 @@
           <a:p>
             <a:fld id="{EB13234A-3D8F-46E3-8754-5FA83D64FA90}" type="slidenum">
               <a:rPr lang="es-BO" smtClean="0"/>
-              <a:t>‹#›</a:t>
+              <a:t>‹Nº›</a:t>
             </a:fld>
             <a:endParaRPr lang="es-BO"/>
           </a:p>
@@ -1904,7 +1904,7 @@
           <a:p>
             <a:fld id="{DBEE0CF6-0569-4550-B7F9-35164B80ED23}" type="datetimeFigureOut">
               <a:rPr lang="es-BO" smtClean="0"/>
-              <a:t>9/4/2019</a:t>
+              <a:t>05/04/2019</a:t>
             </a:fld>
             <a:endParaRPr lang="es-BO"/>
           </a:p>
@@ -1946,7 +1946,7 @@
           <a:p>
             <a:fld id="{EB13234A-3D8F-46E3-8754-5FA83D64FA90}" type="slidenum">
               <a:rPr lang="es-BO" smtClean="0"/>
-              <a:t>‹#›</a:t>
+              <a:t>‹Nº›</a:t>
             </a:fld>
             <a:endParaRPr lang="es-BO"/>
           </a:p>
@@ -1999,7 +1999,7 @@
           <a:p>
             <a:fld id="{DBEE0CF6-0569-4550-B7F9-35164B80ED23}" type="datetimeFigureOut">
               <a:rPr lang="es-BO" smtClean="0"/>
-              <a:t>9/4/2019</a:t>
+              <a:t>05/04/2019</a:t>
             </a:fld>
             <a:endParaRPr lang="es-BO"/>
           </a:p>
@@ -2041,7 +2041,7 @@
           <a:p>
             <a:fld id="{EB13234A-3D8F-46E3-8754-5FA83D64FA90}" type="slidenum">
               <a:rPr lang="es-BO" smtClean="0"/>
-              <a:t>‹#›</a:t>
+              <a:t>‹Nº›</a:t>
             </a:fld>
             <a:endParaRPr lang="es-BO"/>
           </a:p>
@@ -2276,7 +2276,7 @@
           <a:p>
             <a:fld id="{DBEE0CF6-0569-4550-B7F9-35164B80ED23}" type="datetimeFigureOut">
               <a:rPr lang="es-BO" smtClean="0"/>
-              <a:t>9/4/2019</a:t>
+              <a:t>05/04/2019</a:t>
             </a:fld>
             <a:endParaRPr lang="es-BO"/>
           </a:p>
@@ -2318,7 +2318,7 @@
           <a:p>
             <a:fld id="{EB13234A-3D8F-46E3-8754-5FA83D64FA90}" type="slidenum">
               <a:rPr lang="es-BO" smtClean="0"/>
-              <a:t>‹#›</a:t>
+              <a:t>‹Nº›</a:t>
             </a:fld>
             <a:endParaRPr lang="es-BO"/>
           </a:p>
@@ -2529,7 +2529,7 @@
           <a:p>
             <a:fld id="{DBEE0CF6-0569-4550-B7F9-35164B80ED23}" type="datetimeFigureOut">
               <a:rPr lang="es-BO" smtClean="0"/>
-              <a:t>9/4/2019</a:t>
+              <a:t>05/04/2019</a:t>
             </a:fld>
             <a:endParaRPr lang="es-BO"/>
           </a:p>
@@ -2571,7 +2571,7 @@
           <a:p>
             <a:fld id="{EB13234A-3D8F-46E3-8754-5FA83D64FA90}" type="slidenum">
               <a:rPr lang="es-BO" smtClean="0"/>
-              <a:t>‹#›</a:t>
+              <a:t>‹Nº›</a:t>
             </a:fld>
             <a:endParaRPr lang="es-BO"/>
           </a:p>
@@ -2742,7 +2742,7 @@
           <a:p>
             <a:fld id="{DBEE0CF6-0569-4550-B7F9-35164B80ED23}" type="datetimeFigureOut">
               <a:rPr lang="es-BO" smtClean="0"/>
-              <a:t>9/4/2019</a:t>
+              <a:t>05/04/2019</a:t>
             </a:fld>
             <a:endParaRPr lang="es-BO"/>
           </a:p>
@@ -2820,7 +2820,7 @@
           <a:p>
             <a:fld id="{EB13234A-3D8F-46E3-8754-5FA83D64FA90}" type="slidenum">
               <a:rPr lang="es-BO" smtClean="0"/>
-              <a:t>‹#›</a:t>
+              <a:t>‹Nº›</a:t>
             </a:fld>
             <a:endParaRPr lang="es-BO"/>
           </a:p>
@@ -3150,13 +3150,11 @@
         <p:spPr>
           <a:xfrm>
             <a:off x="685800" y="5013176"/>
-            <a:ext cx="8134672" cy="1470025"/>
+            <a:ext cx="7772400" cy="1470025"/>
           </a:xfrm>
         </p:spPr>
         <p:txBody>
-          <a:bodyPr>
-            <a:normAutofit fontScale="90000"/>
-          </a:bodyPr>
+          <a:bodyPr/>
           <a:lstStyle/>
           <a:p>
             <a:pPr algn="ctr"/>
@@ -3176,7 +3174,7 @@
                 </a:effectLst>
                 <a:latin typeface="Arial Rounded MT Bold" panose="020F0704030504030204" pitchFamily="34" charset="0"/>
               </a:rPr>
-              <a:t>Clase 3</a:t>
+              <a:t>Clase 2</a:t>
             </a:r>
             <a:br>
               <a:rPr lang="es-ES" b="1" dirty="0">
@@ -3211,7 +3209,7 @@
                 </a:effectLst>
                 <a:latin typeface="Arial Rounded MT Bold" panose="020F0704030504030204" pitchFamily="34" charset="0"/>
               </a:rPr>
-              <a:t>Tablas, formularios y multimedia</a:t>
+              <a:t>INTRODUCCION HTML</a:t>
             </a:r>
           </a:p>
         </p:txBody>
@@ -3253,7 +3251,7 @@
                 </a:effectLst>
                 <a:latin typeface="Arial Rounded MT Bold" panose="020F0704030504030204" pitchFamily="34" charset="0"/>
               </a:rPr>
-              <a:t>Tutor: Limber Alberto Choque Quisbert</a:t>
+              <a:t>Tutor: Iván Terrazas Paz</a:t>
             </a:r>
           </a:p>
         </p:txBody>
@@ -3304,6 +3302,47 @@
       </p:grpSpPr>
       <p:sp>
         <p:nvSpPr>
+          <p:cNvPr id="2" name="Título 1">
+            <a:extLst>
+              <a:ext uri="{FF2B5EF4-FFF2-40B4-BE49-F238E27FC236}">
+                <a16:creationId xmlns:a16="http://schemas.microsoft.com/office/drawing/2014/main" id="{992FE583-AB43-479D-9DC5-9C5A14E8F6AC}"/>
+              </a:ext>
+            </a:extLst>
+          </p:cNvPr>
+          <p:cNvSpPr>
+            <a:spLocks noGrp="1"/>
+          </p:cNvSpPr>
+          <p:nvPr>
+            <p:ph type="title"/>
+          </p:nvPr>
+        </p:nvSpPr>
+        <p:spPr/>
+        <p:txBody>
+          <a:bodyPr/>
+          <a:lstStyle/>
+          <a:p>
+            <a:r>
+              <a:rPr lang="es-ES" b="1" dirty="0">
+                <a:solidFill>
+                  <a:schemeClr val="accent6">
+                    <a:lumMod val="75000"/>
+                  </a:schemeClr>
+                </a:solidFill>
+                <a:effectLst>
+                  <a:outerShdw blurRad="38100" dist="38100" dir="2700000" algn="tl">
+                    <a:srgbClr val="000000">
+                      <a:alpha val="43137"/>
+                    </a:srgbClr>
+                  </a:outerShdw>
+                </a:effectLst>
+              </a:rPr>
+              <a:t>Títulos</a:t>
+            </a:r>
+          </a:p>
+        </p:txBody>
+      </p:sp>
+      <p:sp>
+        <p:nvSpPr>
           <p:cNvPr id="4" name="Marcador de contenido 3">
             <a:extLst>
               <a:ext uri="{FF2B5EF4-FFF2-40B4-BE49-F238E27FC236}">
@@ -3320,18 +3359,18 @@
         </p:nvSpPr>
         <p:spPr>
           <a:xfrm>
-            <a:off x="971600" y="1259632"/>
+            <a:off x="3923928" y="1417638"/>
             <a:ext cx="2952328" cy="5323730"/>
           </a:xfrm>
         </p:spPr>
         <p:txBody>
           <a:bodyPr>
-            <a:normAutofit fontScale="92500"/>
+            <a:normAutofit fontScale="92500" lnSpcReduction="10000"/>
           </a:bodyPr>
           <a:lstStyle/>
           <a:p>
             <a:r>
-              <a:rPr lang="es-ES" dirty="0" err="1">
+              <a:rPr lang="es-ES" sz="8000" dirty="0">
                 <a:solidFill>
                   <a:srgbClr val="FFFF00"/>
                 </a:solidFill>
@@ -3343,10 +3382,10 @@
                   </a:outerShdw>
                 </a:effectLst>
               </a:rPr>
-              <a:t>img</a:t>
-            </a:r>
-            <a:r>
-              <a:rPr lang="es-ES" dirty="0">
+              <a:t>h1</a:t>
+            </a:r>
+            <a:r>
+              <a:rPr lang="es-ES" sz="8000" dirty="0">
                 <a:solidFill>
                   <a:schemeClr val="bg1">
                     <a:lumMod val="95000"/>
@@ -3360,13 +3399,27 @@
                   </a:outerShdw>
                 </a:effectLst>
               </a:rPr>
-              <a:t> = inserta imagen</a:t>
-            </a:r>
-          </a:p>
-          <a:p>
-            <a:pPr lvl="1"/>
-            <a:r>
-              <a:rPr lang="es-ES" dirty="0" err="1">
+              <a:t> </a:t>
+            </a:r>
+          </a:p>
+          <a:p>
+            <a:r>
+              <a:rPr lang="es-ES" sz="7100" dirty="0">
+                <a:solidFill>
+                  <a:srgbClr val="FFFF00"/>
+                </a:solidFill>
+                <a:effectLst>
+                  <a:outerShdw blurRad="38100" dist="38100" dir="2700000" algn="tl">
+                    <a:srgbClr val="000000">
+                      <a:alpha val="43137"/>
+                    </a:srgbClr>
+                  </a:outerShdw>
+                </a:effectLst>
+              </a:rPr>
+              <a:t>h2</a:t>
+            </a:r>
+            <a:r>
+              <a:rPr lang="es-ES" sz="7200" dirty="0">
                 <a:solidFill>
                   <a:schemeClr val="bg1">
                     <a:lumMod val="95000"/>
@@ -3380,9 +3433,60 @@
                   </a:outerShdw>
                 </a:effectLst>
               </a:rPr>
-              <a:t>src</a:t>
-            </a:r>
-            <a:endParaRPr lang="es-ES" dirty="0">
+              <a:t> </a:t>
+            </a:r>
+          </a:p>
+          <a:p>
+            <a:r>
+              <a:rPr lang="es-ES" sz="5800" dirty="0">
+                <a:solidFill>
+                  <a:srgbClr val="FFFF00"/>
+                </a:solidFill>
+                <a:effectLst>
+                  <a:outerShdw blurRad="38100" dist="38100" dir="2700000" algn="tl">
+                    <a:srgbClr val="000000">
+                      <a:alpha val="43137"/>
+                    </a:srgbClr>
+                  </a:outerShdw>
+                </a:effectLst>
+              </a:rPr>
+              <a:t>h3</a:t>
+            </a:r>
+            <a:r>
+              <a:rPr lang="es-ES" sz="5800" dirty="0">
+                <a:solidFill>
+                  <a:schemeClr val="bg1">
+                    <a:lumMod val="95000"/>
+                  </a:schemeClr>
+                </a:solidFill>
+                <a:effectLst>
+                  <a:outerShdw blurRad="38100" dist="38100" dir="2700000" algn="tl">
+                    <a:srgbClr val="000000">
+                      <a:alpha val="43137"/>
+                    </a:srgbClr>
+                  </a:outerShdw>
+                </a:effectLst>
+              </a:rPr>
+              <a:t> </a:t>
+            </a:r>
+          </a:p>
+          <a:p>
+            <a:r>
+              <a:rPr lang="es-ES" sz="4800" dirty="0">
+                <a:solidFill>
+                  <a:srgbClr val="FFFF00"/>
+                </a:solidFill>
+                <a:effectLst>
+                  <a:outerShdw blurRad="38100" dist="38100" dir="2700000" algn="tl">
+                    <a:srgbClr val="000000">
+                      <a:alpha val="43137"/>
+                    </a:srgbClr>
+                  </a:outerShdw>
+                </a:effectLst>
+              </a:rPr>
+              <a:t>h4</a:t>
+            </a:r>
+            <a:endParaRPr lang="es-ES" sz="4800" dirty="0">
               <a:solidFill>
                 <a:schemeClr val="bg1">
                   <a:lumMod val="95000"/>
@@ -3398,93 +3502,39 @@
             </a:endParaRPr>
           </a:p>
           <a:p>
-            <a:pPr lvl="1"/>
-            <a:r>
-              <a:rPr lang="es-ES" dirty="0" err="1">
-                <a:solidFill>
-                  <a:schemeClr val="bg1">
-                    <a:lumMod val="95000"/>
-                  </a:schemeClr>
-                </a:solidFill>
-                <a:effectLst>
-                  <a:outerShdw blurRad="38100" dist="38100" dir="2700000" algn="tl">
-                    <a:srgbClr val="000000">
-                      <a:alpha val="43137"/>
-                    </a:srgbClr>
-                  </a:outerShdw>
-                </a:effectLst>
-              </a:rPr>
-              <a:t>width</a:t>
-            </a:r>
-            <a:r>
-              <a:rPr lang="es-ES" dirty="0">
-                <a:solidFill>
-                  <a:schemeClr val="bg1">
-                    <a:lumMod val="95000"/>
-                  </a:schemeClr>
-                </a:solidFill>
-                <a:effectLst>
-                  <a:outerShdw blurRad="38100" dist="38100" dir="2700000" algn="tl">
-                    <a:srgbClr val="000000">
-                      <a:alpha val="43137"/>
-                    </a:srgbClr>
-                  </a:outerShdw>
-                </a:effectLst>
-              </a:rPr>
-              <a:t>, </a:t>
-            </a:r>
-            <a:r>
-              <a:rPr lang="es-ES" dirty="0" err="1">
-                <a:solidFill>
-                  <a:schemeClr val="bg1">
-                    <a:lumMod val="95000"/>
-                  </a:schemeClr>
-                </a:solidFill>
-                <a:effectLst>
-                  <a:outerShdw blurRad="38100" dist="38100" dir="2700000" algn="tl">
-                    <a:srgbClr val="000000">
-                      <a:alpha val="43137"/>
-                    </a:srgbClr>
-                  </a:outerShdw>
-                </a:effectLst>
-              </a:rPr>
-              <a:t>height</a:t>
-            </a:r>
-            <a:r>
-              <a:rPr lang="es-ES" dirty="0">
-                <a:solidFill>
-                  <a:schemeClr val="bg1">
-                    <a:lumMod val="95000"/>
-                  </a:schemeClr>
-                </a:solidFill>
-                <a:effectLst>
-                  <a:outerShdw blurRad="38100" dist="38100" dir="2700000" algn="tl">
-                    <a:srgbClr val="000000">
-                      <a:alpha val="43137"/>
-                    </a:srgbClr>
-                  </a:outerShdw>
-                </a:effectLst>
-              </a:rPr>
-              <a:t>, </a:t>
-            </a:r>
-            <a:r>
-              <a:rPr lang="es-ES" dirty="0" err="1">
-                <a:solidFill>
-                  <a:schemeClr val="bg1">
-                    <a:lumMod val="95000"/>
-                  </a:schemeClr>
-                </a:solidFill>
-                <a:effectLst>
-                  <a:outerShdw blurRad="38100" dist="38100" dir="2700000" algn="tl">
-                    <a:srgbClr val="000000">
-                      <a:alpha val="43137"/>
-                    </a:srgbClr>
-                  </a:outerShdw>
-                </a:effectLst>
-              </a:rPr>
-              <a:t>alt</a:t>
-            </a:r>
-            <a:endParaRPr lang="es-ES" dirty="0">
+            <a:r>
+              <a:rPr lang="es-ES" sz="3900" dirty="0">
+                <a:solidFill>
+                  <a:srgbClr val="FFFF00"/>
+                </a:solidFill>
+                <a:effectLst>
+                  <a:outerShdw blurRad="38100" dist="38100" dir="2700000" algn="tl">
+                    <a:srgbClr val="000000">
+                      <a:alpha val="43137"/>
+                    </a:srgbClr>
+                  </a:outerShdw>
+                </a:effectLst>
+              </a:rPr>
+              <a:t>h5</a:t>
+            </a:r>
+          </a:p>
+          <a:p>
+            <a:r>
+              <a:rPr lang="es-ES" sz="3000" dirty="0">
+                <a:solidFill>
+                  <a:srgbClr val="FFFF00"/>
+                </a:solidFill>
+                <a:effectLst>
+                  <a:outerShdw blurRad="38100" dist="38100" dir="2700000" algn="tl">
+                    <a:srgbClr val="000000">
+                      <a:alpha val="43137"/>
+                    </a:srgbClr>
+                  </a:outerShdw>
+                </a:effectLst>
+              </a:rPr>
+              <a:t>h6</a:t>
+            </a:r>
+            <a:endParaRPr lang="es-ES" sz="3000" dirty="0">
               <a:solidFill>
                 <a:schemeClr val="bg1">
                   <a:lumMod val="95000"/>
@@ -3497,188 +3547,6 @@
                   </a:srgbClr>
                 </a:outerShdw>
               </a:effectLst>
-            </a:endParaRPr>
-          </a:p>
-          <a:p>
-            <a:r>
-              <a:rPr lang="es-ES" dirty="0" err="1">
-                <a:solidFill>
-                  <a:srgbClr val="FFFF00"/>
-                </a:solidFill>
-                <a:effectLst>
-                  <a:outerShdw blurRad="38100" dist="38100" dir="2700000" algn="tl">
-                    <a:srgbClr val="000000">
-                      <a:alpha val="43137"/>
-                    </a:srgbClr>
-                  </a:outerShdw>
-                </a:effectLst>
-              </a:rPr>
-              <a:t>picture</a:t>
-            </a:r>
-            <a:r>
-              <a:rPr lang="es-ES" dirty="0">
-                <a:solidFill>
-                  <a:schemeClr val="bg1">
-                    <a:lumMod val="95000"/>
-                  </a:schemeClr>
-                </a:solidFill>
-                <a:effectLst>
-                  <a:outerShdw blurRad="38100" dist="38100" dir="2700000" algn="tl">
-                    <a:srgbClr val="000000">
-                      <a:alpha val="43137"/>
-                    </a:srgbClr>
-                  </a:outerShdw>
-                </a:effectLst>
-              </a:rPr>
-              <a:t> = inserta imagen</a:t>
-            </a:r>
-          </a:p>
-          <a:p>
-            <a:pPr lvl="1"/>
-            <a:r>
-              <a:rPr lang="es-ES" dirty="0" err="1">
-                <a:solidFill>
-                  <a:schemeClr val="bg1">
-                    <a:lumMod val="95000"/>
-                  </a:schemeClr>
-                </a:solidFill>
-                <a:effectLst>
-                  <a:outerShdw blurRad="38100" dist="38100" dir="2700000" algn="tl">
-                    <a:srgbClr val="000000">
-                      <a:alpha val="43137"/>
-                    </a:srgbClr>
-                  </a:outerShdw>
-                </a:effectLst>
-              </a:rPr>
-              <a:t>source</a:t>
-            </a:r>
-            <a:endParaRPr lang="es-ES" dirty="0">
-              <a:solidFill>
-                <a:schemeClr val="bg1">
-                  <a:lumMod val="95000"/>
-                </a:schemeClr>
-              </a:solidFill>
-              <a:effectLst>
-                <a:outerShdw blurRad="38100" dist="38100" dir="2700000" algn="tl">
-                  <a:srgbClr val="000000">
-                    <a:alpha val="43137"/>
-                  </a:srgbClr>
-                </a:outerShdw>
-              </a:effectLst>
-            </a:endParaRPr>
-          </a:p>
-          <a:p>
-            <a:r>
-              <a:rPr lang="es-ES" dirty="0">
-                <a:solidFill>
-                  <a:srgbClr val="FFFF00"/>
-                </a:solidFill>
-                <a:effectLst>
-                  <a:outerShdw blurRad="38100" dist="38100" dir="2700000" algn="tl">
-                    <a:srgbClr val="000000">
-                      <a:alpha val="43137"/>
-                    </a:srgbClr>
-                  </a:outerShdw>
-                </a:effectLst>
-              </a:rPr>
-              <a:t>figure</a:t>
-            </a:r>
-            <a:r>
-              <a:rPr lang="es-ES" dirty="0">
-                <a:solidFill>
-                  <a:schemeClr val="bg1">
-                    <a:lumMod val="95000"/>
-                  </a:schemeClr>
-                </a:solidFill>
-                <a:effectLst>
-                  <a:outerShdw blurRad="38100" dist="38100" dir="2700000" algn="tl">
-                    <a:srgbClr val="000000">
-                      <a:alpha val="43137"/>
-                    </a:srgbClr>
-                  </a:outerShdw>
-                </a:effectLst>
-              </a:rPr>
-              <a:t> = contenido asociado</a:t>
-            </a:r>
-          </a:p>
-          <a:p>
-            <a:r>
-              <a:rPr lang="es-ES" dirty="0" err="1">
-                <a:solidFill>
-                  <a:srgbClr val="FFFF00"/>
-                </a:solidFill>
-                <a:effectLst>
-                  <a:outerShdw blurRad="38100" dist="38100" dir="2700000" algn="tl">
-                    <a:srgbClr val="000000">
-                      <a:alpha val="43137"/>
-                    </a:srgbClr>
-                  </a:outerShdw>
-                </a:effectLst>
-              </a:rPr>
-              <a:t>figcaption</a:t>
-            </a:r>
-            <a:r>
-              <a:rPr lang="es-ES" dirty="0">
-                <a:solidFill>
-                  <a:schemeClr val="bg1">
-                    <a:lumMod val="95000"/>
-                  </a:schemeClr>
-                </a:solidFill>
-                <a:effectLst>
-                  <a:outerShdw blurRad="38100" dist="38100" dir="2700000" algn="tl">
-                    <a:srgbClr val="000000">
-                      <a:alpha val="43137"/>
-                    </a:srgbClr>
-                  </a:outerShdw>
-                </a:effectLst>
-              </a:rPr>
-              <a:t> = titulo del elemento</a:t>
-            </a:r>
-          </a:p>
-        </p:txBody>
-      </p:sp>
-      <p:sp>
-        <p:nvSpPr>
-          <p:cNvPr id="6" name="Title 5">
-            <a:extLst>
-              <a:ext uri="{FF2B5EF4-FFF2-40B4-BE49-F238E27FC236}">
-                <a16:creationId xmlns:a16="http://schemas.microsoft.com/office/drawing/2014/main" id="{71CF1714-578E-4F00-8EBE-11751ADE7103}"/>
-              </a:ext>
-            </a:extLst>
-          </p:cNvPr>
-          <p:cNvSpPr>
-            <a:spLocks noGrp="1"/>
-          </p:cNvSpPr>
-          <p:nvPr>
-            <p:ph type="title"/>
-          </p:nvPr>
-        </p:nvSpPr>
-        <p:spPr>
-          <a:xfrm>
-            <a:off x="611560" y="274638"/>
-            <a:ext cx="8229600" cy="1143000"/>
-          </a:xfrm>
-        </p:spPr>
-        <p:txBody>
-          <a:bodyPr/>
-          <a:lstStyle/>
-          <a:p>
-            <a:r>
-              <a:rPr lang="es-MX" dirty="0">
-                <a:solidFill>
-                  <a:schemeClr val="accent6">
-                    <a:lumMod val="75000"/>
-                  </a:schemeClr>
-                </a:solidFill>
-              </a:rPr>
-              <a:t>Imágenes			Videos</a:t>
-            </a:r>
-            <a:endParaRPr lang="en-US" dirty="0">
-              <a:solidFill>
-                <a:schemeClr val="accent6">
-                  <a:lumMod val="75000"/>
-                </a:schemeClr>
-              </a:solidFill>
             </a:endParaRPr>
           </a:p>
         </p:txBody>
@@ -3763,7 +3631,7 @@
                   </a:outerShdw>
                 </a:effectLst>
               </a:rPr>
-              <a:t>Tablas</a:t>
+              <a:t>Etiquetas de Texto</a:t>
             </a:r>
           </a:p>
         </p:txBody>
@@ -3786,18 +3654,18 @@
         </p:nvSpPr>
         <p:spPr>
           <a:xfrm>
-            <a:off x="2123728" y="1916832"/>
-            <a:ext cx="5256584" cy="4027586"/>
+            <a:off x="2195736" y="1417638"/>
+            <a:ext cx="4680520" cy="5323730"/>
           </a:xfrm>
         </p:spPr>
         <p:txBody>
           <a:bodyPr>
-            <a:normAutofit/>
+            <a:normAutofit lnSpcReduction="10000"/>
           </a:bodyPr>
           <a:lstStyle/>
           <a:p>
             <a:r>
-              <a:rPr lang="es-ES" sz="3200" dirty="0">
+              <a:rPr lang="es-ES" dirty="0">
                 <a:solidFill>
                   <a:srgbClr val="FFFF00"/>
                 </a:solidFill>
@@ -3809,7 +3677,7 @@
                   </a:outerShdw>
                 </a:effectLst>
               </a:rPr>
-              <a:t>table</a:t>
+              <a:t>p</a:t>
             </a:r>
             <a:r>
               <a:rPr lang="es-ES" dirty="0">
@@ -3826,10 +3694,27 @@
                   </a:outerShdw>
                 </a:effectLst>
               </a:rPr>
-              <a:t> = </a:t>
-            </a:r>
-            <a:r>
-              <a:rPr lang="es-ES" sz="3200" dirty="0">
+              <a:t> = párrafo</a:t>
+            </a:r>
+          </a:p>
+          <a:p>
+            <a:r>
+              <a:rPr lang="es-ES" dirty="0">
+                <a:solidFill>
+                  <a:srgbClr val="FFFF00"/>
+                </a:solidFill>
+                <a:effectLst>
+                  <a:outerShdw blurRad="38100" dist="38100" dir="2700000" algn="tl">
+                    <a:srgbClr val="000000">
+                      <a:alpha val="43137"/>
+                    </a:srgbClr>
+                  </a:outerShdw>
+                </a:effectLst>
+              </a:rPr>
+              <a:t>pre</a:t>
+            </a:r>
+            <a:r>
+              <a:rPr lang="es-ES" dirty="0">
                 <a:solidFill>
                   <a:schemeClr val="bg1">
                     <a:lumMod val="95000"/>
@@ -3843,13 +3728,27 @@
                   </a:outerShdw>
                 </a:effectLst>
               </a:rPr>
-              <a:t>inicio de una tabla</a:t>
-            </a:r>
-          </a:p>
-          <a:p>
-            <a:pPr lvl="1"/>
-            <a:r>
-              <a:rPr lang="es-ES" sz="3200" dirty="0" err="1">
+              <a:t> = párrafo predefinido</a:t>
+            </a:r>
+          </a:p>
+          <a:p>
+            <a:r>
+              <a:rPr lang="es-ES" dirty="0" err="1">
+                <a:solidFill>
+                  <a:srgbClr val="FFFF00"/>
+                </a:solidFill>
+                <a:effectLst>
+                  <a:outerShdw blurRad="38100" dist="38100" dir="2700000" algn="tl">
+                    <a:srgbClr val="000000">
+                      <a:alpha val="43137"/>
+                    </a:srgbClr>
+                  </a:outerShdw>
+                </a:effectLst>
+              </a:rPr>
+              <a:t>span</a:t>
+            </a:r>
+            <a:r>
+              <a:rPr lang="es-ES" dirty="0">
                 <a:solidFill>
                   <a:schemeClr val="bg1">
                     <a:lumMod val="95000"/>
@@ -3863,10 +3762,13 @@
                   </a:outerShdw>
                 </a:effectLst>
               </a:rPr>
-              <a:t>thead</a:t>
-            </a:r>
-            <a:r>
-              <a:rPr lang="es-ES" sz="3200" dirty="0">
+              <a:t> = párrafo sin estilo</a:t>
+            </a:r>
+          </a:p>
+          <a:p>
+            <a:pPr lvl="1"/>
+            <a:r>
+              <a:rPr lang="es-ES" dirty="0" err="1">
                 <a:solidFill>
                   <a:schemeClr val="bg1">
                     <a:lumMod val="95000"/>
@@ -3880,60 +3782,9 @@
                   </a:outerShdw>
                 </a:effectLst>
               </a:rPr>
-              <a:t>, </a:t>
-            </a:r>
-            <a:r>
-              <a:rPr lang="es-ES" sz="3200" dirty="0" err="1">
-                <a:solidFill>
-                  <a:schemeClr val="bg1">
-                    <a:lumMod val="95000"/>
-                  </a:schemeClr>
-                </a:solidFill>
-                <a:effectLst>
-                  <a:outerShdw blurRad="38100" dist="38100" dir="2700000" algn="tl">
-                    <a:srgbClr val="000000">
-                      <a:alpha val="43137"/>
-                    </a:srgbClr>
-                  </a:outerShdw>
-                </a:effectLst>
-              </a:rPr>
-              <a:t>tbody</a:t>
-            </a:r>
-            <a:r>
-              <a:rPr lang="es-ES" sz="3200" dirty="0">
-                <a:solidFill>
-                  <a:schemeClr val="bg1">
-                    <a:lumMod val="95000"/>
-                  </a:schemeClr>
-                </a:solidFill>
-                <a:effectLst>
-                  <a:outerShdw blurRad="38100" dist="38100" dir="2700000" algn="tl">
-                    <a:srgbClr val="000000">
-                      <a:alpha val="43137"/>
-                    </a:srgbClr>
-                  </a:outerShdw>
-                </a:effectLst>
-              </a:rPr>
-              <a:t>, </a:t>
-            </a:r>
-            <a:r>
-              <a:rPr lang="es-ES" sz="3200" dirty="0" err="1">
-                <a:solidFill>
-                  <a:schemeClr val="bg1">
-                    <a:lumMod val="95000"/>
-                  </a:schemeClr>
-                </a:solidFill>
-                <a:effectLst>
-                  <a:outerShdw blurRad="38100" dist="38100" dir="2700000" algn="tl">
-                    <a:srgbClr val="000000">
-                      <a:alpha val="43137"/>
-                    </a:srgbClr>
-                  </a:outerShdw>
-                </a:effectLst>
-              </a:rPr>
-              <a:t>tfoot</a:t>
-            </a:r>
-            <a:endParaRPr lang="es-ES" sz="3200" dirty="0">
+              <a:t>translate</a:t>
+            </a:r>
+            <a:endParaRPr lang="es-ES" dirty="0">
               <a:solidFill>
                 <a:schemeClr val="bg1">
                   <a:lumMod val="95000"/>
@@ -3951,7 +3802,7 @@
           <a:p>
             <a:pPr lvl="1"/>
             <a:r>
-              <a:rPr lang="es-ES" sz="3200" dirty="0" err="1">
+              <a:rPr lang="es-ES" dirty="0" err="1">
                 <a:solidFill>
                   <a:schemeClr val="bg1">
                     <a:lumMod val="95000"/>
@@ -3965,77 +3816,9 @@
                   </a:outerShdw>
                 </a:effectLst>
               </a:rPr>
-              <a:t>tr</a:t>
-            </a:r>
-            <a:r>
-              <a:rPr lang="es-ES" sz="3200" dirty="0">
-                <a:solidFill>
-                  <a:schemeClr val="bg1">
-                    <a:lumMod val="95000"/>
-                  </a:schemeClr>
-                </a:solidFill>
-                <a:effectLst>
-                  <a:outerShdw blurRad="38100" dist="38100" dir="2700000" algn="tl">
-                    <a:srgbClr val="000000">
-                      <a:alpha val="43137"/>
-                    </a:srgbClr>
-                  </a:outerShdw>
-                </a:effectLst>
-              </a:rPr>
-              <a:t>, </a:t>
-            </a:r>
-            <a:r>
-              <a:rPr lang="es-ES" sz="3200" dirty="0" err="1">
-                <a:solidFill>
-                  <a:schemeClr val="bg1">
-                    <a:lumMod val="95000"/>
-                  </a:schemeClr>
-                </a:solidFill>
-                <a:effectLst>
-                  <a:outerShdw blurRad="38100" dist="38100" dir="2700000" algn="tl">
-                    <a:srgbClr val="000000">
-                      <a:alpha val="43137"/>
-                    </a:srgbClr>
-                  </a:outerShdw>
-                </a:effectLst>
-              </a:rPr>
-              <a:t>th</a:t>
-            </a:r>
-            <a:r>
-              <a:rPr lang="es-ES" sz="3200" dirty="0">
-                <a:solidFill>
-                  <a:schemeClr val="bg1">
-                    <a:lumMod val="95000"/>
-                  </a:schemeClr>
-                </a:solidFill>
-                <a:effectLst>
-                  <a:outerShdw blurRad="38100" dist="38100" dir="2700000" algn="tl">
-                    <a:srgbClr val="000000">
-                      <a:alpha val="43137"/>
-                    </a:srgbClr>
-                  </a:outerShdw>
-                </a:effectLst>
-              </a:rPr>
-              <a:t>, </a:t>
-            </a:r>
-            <a:r>
-              <a:rPr lang="es-ES" sz="3200" dirty="0" err="1">
-                <a:solidFill>
-                  <a:schemeClr val="bg1">
-                    <a:lumMod val="95000"/>
-                  </a:schemeClr>
-                </a:solidFill>
-                <a:effectLst>
-                  <a:outerShdw blurRad="38100" dist="38100" dir="2700000" algn="tl">
-                    <a:srgbClr val="000000">
-                      <a:alpha val="43137"/>
-                    </a:srgbClr>
-                  </a:outerShdw>
-                </a:effectLst>
-              </a:rPr>
-              <a:t>td</a:t>
-            </a:r>
-            <a:endParaRPr lang="es-ES" sz="3200" dirty="0">
+              <a:t>contenteditable</a:t>
+            </a:r>
+            <a:endParaRPr lang="es-ES" dirty="0">
               <a:solidFill>
                 <a:schemeClr val="bg1">
                   <a:lumMod val="95000"/>
@@ -4051,9 +3834,23 @@
             </a:endParaRPr>
           </a:p>
           <a:p>
-            <a:pPr lvl="1"/>
-            <a:r>
-              <a:rPr lang="es-ES" sz="3200" dirty="0" err="1">
+            <a:r>
+              <a:rPr lang="es-ES" dirty="0" err="1">
+                <a:solidFill>
+                  <a:srgbClr val="FFFF00"/>
+                </a:solidFill>
+                <a:effectLst>
+                  <a:outerShdw blurRad="38100" dist="38100" dir="2700000" algn="tl">
+                    <a:srgbClr val="000000">
+                      <a:alpha val="43137"/>
+                    </a:srgbClr>
+                  </a:outerShdw>
+                </a:effectLst>
+              </a:rPr>
+              <a:t>br</a:t>
+            </a:r>
+            <a:r>
+              <a:rPr lang="es-ES" dirty="0">
                 <a:solidFill>
                   <a:schemeClr val="bg1">
                     <a:lumMod val="95000"/>
@@ -4067,10 +3864,27 @@
                   </a:outerShdw>
                 </a:effectLst>
               </a:rPr>
-              <a:t>rowspan</a:t>
-            </a:r>
-            <a:r>
-              <a:rPr lang="es-ES" sz="3200" dirty="0">
+              <a:t> = salto de línea</a:t>
+            </a:r>
+          </a:p>
+          <a:p>
+            <a:r>
+              <a:rPr lang="es-ES" dirty="0">
+                <a:solidFill>
+                  <a:srgbClr val="FFFF00"/>
+                </a:solidFill>
+                <a:effectLst>
+                  <a:outerShdw blurRad="38100" dist="38100" dir="2700000" algn="tl">
+                    <a:srgbClr val="000000">
+                      <a:alpha val="43137"/>
+                    </a:srgbClr>
+                  </a:outerShdw>
+                </a:effectLst>
+              </a:rPr>
+              <a:t>u</a:t>
+            </a:r>
+            <a:r>
+              <a:rPr lang="es-ES" dirty="0">
                 <a:solidFill>
                   <a:schemeClr val="bg1">
                     <a:lumMod val="95000"/>
@@ -4084,13 +3898,27 @@
                   </a:outerShdw>
                 </a:effectLst>
               </a:rPr>
-              <a:t> = reemplaza el numero de filas</a:t>
-            </a:r>
-          </a:p>
-          <a:p>
-            <a:pPr lvl="1"/>
-            <a:r>
-              <a:rPr lang="es-ES" sz="3200" dirty="0" err="1">
+              <a:t> = subrayado</a:t>
+            </a:r>
+          </a:p>
+          <a:p>
+            <a:r>
+              <a:rPr lang="es-ES" dirty="0">
+                <a:solidFill>
+                  <a:srgbClr val="FFFF00"/>
+                </a:solidFill>
+                <a:effectLst>
+                  <a:outerShdw blurRad="38100" dist="38100" dir="2700000" algn="tl">
+                    <a:srgbClr val="000000">
+                      <a:alpha val="43137"/>
+                    </a:srgbClr>
+                  </a:outerShdw>
+                </a:effectLst>
+              </a:rPr>
+              <a:t>em</a:t>
+            </a:r>
+            <a:r>
+              <a:rPr lang="es-ES" dirty="0">
                 <a:solidFill>
                   <a:schemeClr val="bg1">
                     <a:lumMod val="95000"/>
@@ -4104,10 +3932,27 @@
                   </a:outerShdw>
                 </a:effectLst>
               </a:rPr>
-              <a:t>colspan</a:t>
-            </a:r>
-            <a:r>
-              <a:rPr lang="es-ES" sz="3200" dirty="0">
+              <a:t> = énfasis cursiva</a:t>
+            </a:r>
+          </a:p>
+          <a:p>
+            <a:r>
+              <a:rPr lang="es-ES" dirty="0">
+                <a:solidFill>
+                  <a:srgbClr val="FFFF00"/>
+                </a:solidFill>
+                <a:effectLst>
+                  <a:outerShdw blurRad="38100" dist="38100" dir="2700000" algn="tl">
+                    <a:srgbClr val="000000">
+                      <a:alpha val="43137"/>
+                    </a:srgbClr>
+                  </a:outerShdw>
+                </a:effectLst>
+              </a:rPr>
+              <a:t>i</a:t>
+            </a:r>
+            <a:r>
+              <a:rPr lang="es-ES" dirty="0">
                 <a:solidFill>
                   <a:schemeClr val="bg1">
                     <a:lumMod val="95000"/>
@@ -4121,7 +3966,75 @@
                   </a:outerShdw>
                 </a:effectLst>
               </a:rPr>
-              <a:t> = reemplaza el numero de columnas</a:t>
+              <a:t> = estilo cursiva</a:t>
+            </a:r>
+          </a:p>
+          <a:p>
+            <a:r>
+              <a:rPr lang="es-ES" dirty="0" err="1">
+                <a:solidFill>
+                  <a:srgbClr val="FFFF00"/>
+                </a:solidFill>
+                <a:effectLst>
+                  <a:outerShdw blurRad="38100" dist="38100" dir="2700000" algn="tl">
+                    <a:srgbClr val="000000">
+                      <a:alpha val="43137"/>
+                    </a:srgbClr>
+                  </a:outerShdw>
+                </a:effectLst>
+              </a:rPr>
+              <a:t>strong</a:t>
+            </a:r>
+            <a:r>
+              <a:rPr lang="es-ES" dirty="0">
+                <a:solidFill>
+                  <a:schemeClr val="bg1">
+                    <a:lumMod val="95000"/>
+                  </a:schemeClr>
+                </a:solidFill>
+                <a:effectLst>
+                  <a:outerShdw blurRad="38100" dist="38100" dir="2700000" algn="tl">
+                    <a:srgbClr val="000000">
+                      <a:alpha val="43137"/>
+                    </a:srgbClr>
+                  </a:outerShdw>
+                </a:effectLst>
+              </a:rPr>
+              <a:t> = énfasis fuerte</a:t>
+            </a:r>
+          </a:p>
+          <a:p>
+            <a:r>
+              <a:rPr lang="es-ES" dirty="0">
+                <a:solidFill>
+                  <a:srgbClr val="FFFF00"/>
+                </a:solidFill>
+                <a:effectLst>
+                  <a:outerShdw blurRad="38100" dist="38100" dir="2700000" algn="tl">
+                    <a:srgbClr val="000000">
+                      <a:alpha val="43137"/>
+                    </a:srgbClr>
+                  </a:outerShdw>
+                </a:effectLst>
+              </a:rPr>
+              <a:t>b</a:t>
+            </a:r>
+            <a:r>
+              <a:rPr lang="es-ES" dirty="0">
+                <a:solidFill>
+                  <a:schemeClr val="bg1">
+                    <a:lumMod val="95000"/>
+                  </a:schemeClr>
+                </a:solidFill>
+                <a:effectLst>
+                  <a:outerShdw blurRad="38100" dist="38100" dir="2700000" algn="tl">
+                    <a:srgbClr val="000000">
+                      <a:alpha val="43137"/>
+                    </a:srgbClr>
+                  </a:outerShdw>
+                </a:effectLst>
+              </a:rPr>
+              <a:t> = estilo cursiva</a:t>
             </a:r>
           </a:p>
           <a:p>
@@ -4222,17 +4135,17 @@
                   </a:outerShdw>
                 </a:effectLst>
               </a:rPr>
-              <a:t>Formularios</a:t>
-            </a:r>
-          </a:p>
-        </p:txBody>
-      </p:sp>
-      <p:sp>
-        <p:nvSpPr>
-          <p:cNvPr id="4" name="Marcador de contenido 3">
+              <a:t>Etiquetas de Texto</a:t>
+            </a:r>
+          </a:p>
+        </p:txBody>
+      </p:sp>
+      <p:sp>
+        <p:nvSpPr>
+          <p:cNvPr id="5" name="Marcador de contenido 4">
             <a:extLst>
               <a:ext uri="{FF2B5EF4-FFF2-40B4-BE49-F238E27FC236}">
-                <a16:creationId xmlns:a16="http://schemas.microsoft.com/office/drawing/2014/main" id="{A724E4FA-29C1-449A-9BEC-41D0CA72CBD6}"/>
+                <a16:creationId xmlns:a16="http://schemas.microsoft.com/office/drawing/2014/main" id="{B9A802B3-F0E8-4363-9FEF-BD5CF12E5181}"/>
               </a:ext>
             </a:extLst>
           </p:cNvPr>
@@ -4240,13 +4153,13 @@
             <a:spLocks noGrp="1"/>
           </p:cNvSpPr>
           <p:nvPr>
-            <p:ph sz="half" idx="1"/>
+            <p:ph sz="half" idx="2"/>
           </p:nvPr>
         </p:nvSpPr>
         <p:spPr>
           <a:xfrm>
-            <a:off x="1403648" y="1417638"/>
-            <a:ext cx="7056784" cy="5323730"/>
+            <a:off x="1691680" y="1600200"/>
+            <a:ext cx="7128792" cy="4983162"/>
           </a:xfrm>
         </p:spPr>
         <p:txBody>
@@ -4268,22 +4181,7 @@
                   </a:outerShdw>
                 </a:effectLst>
               </a:rPr>
-              <a:t>form</a:t>
-            </a:r>
-            <a:r>
-              <a:rPr lang="es-ES" dirty="0">
-                <a:solidFill>
-                  <a:srgbClr val="FFFF00"/>
-                </a:solidFill>
-                <a:effectLst>
-                  <a:outerShdw blurRad="38100" dist="38100" dir="2700000" algn="tl">
-                    <a:srgbClr val="000000">
-                      <a:alpha val="43137"/>
-                    </a:srgbClr>
-                  </a:outerShdw>
-                </a:effectLst>
-              </a:rPr>
-              <a:t> </a:t>
+              <a:t>mark</a:t>
             </a:r>
             <a:r>
               <a:rPr lang="es-ES" dirty="0">
@@ -4300,66 +4198,61 @@
                   </a:outerShdw>
                 </a:effectLst>
               </a:rPr>
-              <a:t>= apertura del formulario </a:t>
-            </a:r>
-          </a:p>
-          <a:p>
+              <a:t> = resalta el texto</a:t>
+            </a:r>
+          </a:p>
+          <a:p>
+            <a:r>
+              <a:rPr lang="es-ES" dirty="0" err="1">
+                <a:solidFill>
+                  <a:srgbClr val="FFFF00"/>
+                </a:solidFill>
+                <a:effectLst>
+                  <a:outerShdw blurRad="38100" dist="38100" dir="2700000" algn="tl">
+                    <a:srgbClr val="000000">
+                      <a:alpha val="43137"/>
+                    </a:srgbClr>
+                  </a:outerShdw>
+                </a:effectLst>
+              </a:rPr>
+              <a:t>small</a:t>
+            </a:r>
             <a:r>
               <a:rPr lang="es-ES" dirty="0">
-                <a:solidFill>
-                  <a:srgbClr val="FFFF00"/>
-                </a:solidFill>
-                <a:effectLst>
-                  <a:outerShdw blurRad="38100" dist="38100" dir="2700000" algn="tl">
-                    <a:srgbClr val="000000">
-                      <a:alpha val="43137"/>
-                    </a:srgbClr>
-                  </a:outerShdw>
-                </a:effectLst>
-              </a:rPr>
-              <a:t>Input</a:t>
-            </a:r>
-          </a:p>
-          <a:p>
-            <a:pPr lvl="1"/>
-            <a:r>
-              <a:rPr lang="en-US" sz="2800" dirty="0">
-                <a:solidFill>
-                  <a:srgbClr val="FFC000"/>
-                </a:solidFill>
-              </a:rPr>
-              <a:t>type</a:t>
-            </a:r>
-            <a:r>
-              <a:rPr lang="en-US" sz="2800" dirty="0">
                 <a:solidFill>
                   <a:schemeClr val="bg1">
                     <a:lumMod val="95000"/>
                   </a:schemeClr>
                 </a:solidFill>
-              </a:rPr>
-              <a:t> = "text | password | checkbox | radio | submit | reset | file | hidden | image | button“</a:t>
-            </a:r>
-          </a:p>
-          <a:p>
-            <a:pPr lvl="1"/>
-            <a:r>
-              <a:rPr lang="es-ES" sz="2800" dirty="0" err="1">
-                <a:solidFill>
-                  <a:srgbClr val="FFC000"/>
-                </a:solidFill>
-                <a:effectLst>
-                  <a:outerShdw blurRad="38100" dist="38100" dir="2700000" algn="tl">
-                    <a:srgbClr val="000000">
-                      <a:alpha val="43137"/>
-                    </a:srgbClr>
-                  </a:outerShdw>
-                </a:effectLst>
-              </a:rPr>
-              <a:t>name</a:t>
-            </a:r>
-            <a:r>
-              <a:rPr lang="es-ES" sz="2800" dirty="0">
+                <a:effectLst>
+                  <a:outerShdw blurRad="38100" dist="38100" dir="2700000" algn="tl">
+                    <a:srgbClr val="000000">
+                      <a:alpha val="43137"/>
+                    </a:srgbClr>
+                  </a:outerShdw>
+                </a:effectLst>
+              </a:rPr>
+              <a:t> = letra pequeña</a:t>
+            </a:r>
+          </a:p>
+          <a:p>
+            <a:r>
+              <a:rPr lang="es-ES" dirty="0">
+                <a:solidFill>
+                  <a:srgbClr val="FFFF00"/>
+                </a:solidFill>
+                <a:effectLst>
+                  <a:outerShdw blurRad="38100" dist="38100" dir="2700000" algn="tl">
+                    <a:srgbClr val="000000">
+                      <a:alpha val="43137"/>
+                    </a:srgbClr>
+                  </a:outerShdw>
+                </a:effectLst>
+              </a:rPr>
+              <a:t>cite</a:t>
+            </a:r>
+            <a:r>
+              <a:rPr lang="es-ES" dirty="0">
                 <a:solidFill>
                   <a:schemeClr val="bg1">
                     <a:lumMod val="95000"/>
@@ -4373,10 +4266,27 @@
                   </a:outerShdw>
                 </a:effectLst>
               </a:rPr>
-              <a:t> = “</a:t>
-            </a:r>
-            <a:r>
-              <a:rPr lang="es-ES" sz="2800" dirty="0" err="1">
+              <a:t> = autor o titulo de obra</a:t>
+            </a:r>
+          </a:p>
+          <a:p>
+            <a:r>
+              <a:rPr lang="es-ES" dirty="0" err="1">
+                <a:solidFill>
+                  <a:srgbClr val="FFFF00"/>
+                </a:solidFill>
+                <a:effectLst>
+                  <a:outerShdw blurRad="38100" dist="38100" dir="2700000" algn="tl">
+                    <a:srgbClr val="000000">
+                      <a:alpha val="43137"/>
+                    </a:srgbClr>
+                  </a:outerShdw>
+                </a:effectLst>
+              </a:rPr>
+              <a:t>address</a:t>
+            </a:r>
+            <a:r>
+              <a:rPr lang="es-ES" dirty="0">
                 <a:solidFill>
                   <a:schemeClr val="bg1">
                     <a:lumMod val="95000"/>
@@ -4390,10 +4300,27 @@
                   </a:outerShdw>
                 </a:effectLst>
               </a:rPr>
-              <a:t>text</a:t>
-            </a:r>
-            <a:r>
-              <a:rPr lang="es-ES" sz="2800" dirty="0">
+              <a:t> = información de contacto</a:t>
+            </a:r>
+          </a:p>
+          <a:p>
+            <a:r>
+              <a:rPr lang="es-ES" dirty="0">
+                <a:solidFill>
+                  <a:srgbClr val="FFFF00"/>
+                </a:solidFill>
+                <a:effectLst>
+                  <a:outerShdw blurRad="38100" dist="38100" dir="2700000" algn="tl">
+                    <a:srgbClr val="000000">
+                      <a:alpha val="43137"/>
+                    </a:srgbClr>
+                  </a:outerShdw>
+                </a:effectLst>
+              </a:rPr>
+              <a:t>time</a:t>
+            </a:r>
+            <a:r>
+              <a:rPr lang="es-ES" dirty="0">
                 <a:solidFill>
                   <a:schemeClr val="bg1">
                     <a:lumMod val="95000"/>
@@ -4407,28 +4334,27 @@
                   </a:outerShdw>
                 </a:effectLst>
               </a:rPr>
-              <a:t>” asigna un nombre al control</a:t>
-            </a:r>
-          </a:p>
-          <a:p>
-            <a:pPr lvl="1"/>
-            <a:r>
-              <a:rPr lang="es-ES" sz="2800" dirty="0" err="1">
-                <a:solidFill>
-                  <a:srgbClr val="FFC000"/>
-                </a:solidFill>
-                <a:effectLst>
-                  <a:outerShdw blurRad="38100" dist="38100" dir="2700000" algn="tl">
-                    <a:srgbClr val="000000">
-                      <a:alpha val="43137"/>
-                    </a:srgbClr>
-                  </a:outerShdw>
-                </a:effectLst>
-              </a:rPr>
-              <a:t>value</a:t>
-            </a:r>
-            <a:r>
-              <a:rPr lang="es-ES" sz="2800" dirty="0">
+              <a:t> = fecha</a:t>
+            </a:r>
+          </a:p>
+          <a:p>
+            <a:r>
+              <a:rPr lang="es-ES" dirty="0" err="1">
+                <a:solidFill>
+                  <a:srgbClr val="FFFF00"/>
+                </a:solidFill>
+                <a:effectLst>
+                  <a:outerShdw blurRad="38100" dist="38100" dir="2700000" algn="tl">
+                    <a:srgbClr val="000000">
+                      <a:alpha val="43137"/>
+                    </a:srgbClr>
+                  </a:outerShdw>
+                </a:effectLst>
+              </a:rPr>
+              <a:t>code</a:t>
+            </a:r>
+            <a:r>
+              <a:rPr lang="es-ES" dirty="0">
                 <a:solidFill>
                   <a:schemeClr val="bg1">
                     <a:lumMod val="95000"/>
@@ -4442,10 +4368,27 @@
                   </a:outerShdw>
                 </a:effectLst>
               </a:rPr>
-              <a:t> =“</a:t>
-            </a:r>
-            <a:r>
-              <a:rPr lang="es-ES" sz="2800" dirty="0" err="1">
+              <a:t> = código de programación</a:t>
+            </a:r>
+          </a:p>
+          <a:p>
+            <a:r>
+              <a:rPr lang="es-ES" dirty="0">
+                <a:solidFill>
+                  <a:srgbClr val="FFFF00"/>
+                </a:solidFill>
+                <a:effectLst>
+                  <a:outerShdw blurRad="38100" dist="38100" dir="2700000" algn="tl">
+                    <a:srgbClr val="000000">
+                      <a:alpha val="43137"/>
+                    </a:srgbClr>
+                  </a:outerShdw>
+                </a:effectLst>
+              </a:rPr>
+              <a:t>data</a:t>
+            </a:r>
+            <a:r>
+              <a:rPr lang="es-ES" dirty="0">
                 <a:solidFill>
                   <a:schemeClr val="bg1">
                     <a:lumMod val="95000"/>
@@ -4459,10 +4402,13 @@
                   </a:outerShdw>
                 </a:effectLst>
               </a:rPr>
-              <a:t>text</a:t>
-            </a:r>
-            <a:r>
-              <a:rPr lang="es-ES" sz="2800" dirty="0">
+              <a:t> = datos genéricos</a:t>
+            </a:r>
+          </a:p>
+          <a:p>
+            <a:pPr lvl="1"/>
+            <a:r>
+              <a:rPr lang="es-ES" dirty="0" err="1">
                 <a:solidFill>
                   <a:schemeClr val="bg1">
                     <a:lumMod val="95000"/>
@@ -4476,52 +4422,8 @@
                   </a:outerShdw>
                 </a:effectLst>
               </a:rPr>
-              <a:t>” valor inicial del control</a:t>
-            </a:r>
-          </a:p>
-          <a:p>
-            <a:pPr lvl="1"/>
-            <a:r>
-              <a:rPr lang="en-US" sz="2800" dirty="0">
-                <a:solidFill>
-                  <a:srgbClr val="FFC000"/>
-                </a:solidFill>
-              </a:rPr>
-              <a:t>placeholder</a:t>
-            </a:r>
-            <a:r>
-              <a:rPr lang="en-US" sz="2800" dirty="0">
-                <a:solidFill>
-                  <a:schemeClr val="bg1">
-                    <a:lumMod val="95000"/>
-                  </a:schemeClr>
-                </a:solidFill>
-              </a:rPr>
-              <a:t> = </a:t>
-            </a:r>
-            <a:r>
-              <a:rPr lang="es-MX" sz="2800" dirty="0">
-                <a:solidFill>
-                  <a:schemeClr val="bg1">
-                    <a:lumMod val="95000"/>
-                  </a:schemeClr>
-                </a:solidFill>
-              </a:rPr>
-              <a:t>descripción</a:t>
-            </a:r>
-            <a:r>
-              <a:rPr lang="en-US" sz="2800" dirty="0">
-                <a:solidFill>
-                  <a:schemeClr val="bg1">
-                    <a:lumMod val="95000"/>
-                  </a:schemeClr>
-                </a:solidFill>
-              </a:rPr>
-              <a:t> del campo</a:t>
-            </a:r>
-          </a:p>
-          <a:p>
-            <a:pPr lvl="1"/>
+              <a:t>value</a:t>
+            </a:r>
             <a:endParaRPr lang="es-ES" dirty="0">
               <a:solidFill>
                 <a:schemeClr val="bg1">
@@ -4537,29 +4439,12 @@
               </a:effectLst>
             </a:endParaRPr>
           </a:p>
-          <a:p>
-            <a:pPr lvl="1"/>
-            <a:endParaRPr lang="es-ES" dirty="0">
-              <a:solidFill>
-                <a:schemeClr val="bg1">
-                  <a:lumMod val="95000"/>
-                </a:schemeClr>
-              </a:solidFill>
-              <a:effectLst>
-                <a:outerShdw blurRad="38100" dist="38100" dir="2700000" algn="tl">
-                  <a:srgbClr val="000000">
-                    <a:alpha val="43137"/>
-                  </a:srgbClr>
-                </a:outerShdw>
-              </a:effectLst>
-            </a:endParaRPr>
-          </a:p>
         </p:txBody>
       </p:sp>
     </p:spTree>
     <p:extLst>
       <p:ext uri="{BB962C8B-B14F-4D97-AF65-F5344CB8AC3E}">
-        <p14:creationId xmlns:p14="http://schemas.microsoft.com/office/powerpoint/2010/main" val="886563333"/>
+        <p14:creationId xmlns:p14="http://schemas.microsoft.com/office/powerpoint/2010/main" val="3063831654"/>
       </p:ext>
     </p:extLst>
   </p:cSld>
@@ -4602,6 +4487,366 @@
       </p:grpSpPr>
       <p:sp>
         <p:nvSpPr>
+          <p:cNvPr id="2" name="Título 1">
+            <a:extLst>
+              <a:ext uri="{FF2B5EF4-FFF2-40B4-BE49-F238E27FC236}">
+                <a16:creationId xmlns:a16="http://schemas.microsoft.com/office/drawing/2014/main" id="{992FE583-AB43-479D-9DC5-9C5A14E8F6AC}"/>
+              </a:ext>
+            </a:extLst>
+          </p:cNvPr>
+          <p:cNvSpPr>
+            <a:spLocks noGrp="1"/>
+          </p:cNvSpPr>
+          <p:nvPr>
+            <p:ph type="title"/>
+          </p:nvPr>
+        </p:nvSpPr>
+        <p:spPr/>
+        <p:txBody>
+          <a:bodyPr/>
+          <a:lstStyle/>
+          <a:p>
+            <a:r>
+              <a:rPr lang="es-ES" b="1" dirty="0">
+                <a:solidFill>
+                  <a:schemeClr val="accent6">
+                    <a:lumMod val="75000"/>
+                  </a:schemeClr>
+                </a:solidFill>
+                <a:effectLst>
+                  <a:outerShdw blurRad="38100" dist="38100" dir="2700000" algn="tl">
+                    <a:srgbClr val="000000">
+                      <a:alpha val="43137"/>
+                    </a:srgbClr>
+                  </a:outerShdw>
+                </a:effectLst>
+              </a:rPr>
+              <a:t>Listas</a:t>
+            </a:r>
+          </a:p>
+        </p:txBody>
+      </p:sp>
+      <p:graphicFrame>
+        <p:nvGraphicFramePr>
+          <p:cNvPr id="3" name="Tabla 2">
+            <a:extLst>
+              <a:ext uri="{FF2B5EF4-FFF2-40B4-BE49-F238E27FC236}">
+                <a16:creationId xmlns:a16="http://schemas.microsoft.com/office/drawing/2014/main" id="{E95CE89D-A60B-4C2B-898C-3D181ABE0DA1}"/>
+              </a:ext>
+            </a:extLst>
+          </p:cNvPr>
+          <p:cNvGraphicFramePr>
+            <a:graphicFrameLocks noGrp="1"/>
+          </p:cNvGraphicFramePr>
+          <p:nvPr>
+            <p:extLst>
+              <p:ext uri="{D42A27DB-BD31-4B8C-83A1-F6EECF244321}">
+                <p14:modId xmlns:p14="http://schemas.microsoft.com/office/powerpoint/2010/main" val="295123546"/>
+              </p:ext>
+            </p:extLst>
+          </p:nvPr>
+        </p:nvGraphicFramePr>
+        <p:xfrm>
+          <a:off x="457200" y="1620358"/>
+          <a:ext cx="8229600" cy="4963004"/>
+        </p:xfrm>
+        <a:graphic>
+          <a:graphicData uri="http://schemas.openxmlformats.org/drawingml/2006/table">
+            <a:tbl>
+              <a:tblPr firstRow="1" bandRow="1">
+                <a:tableStyleId>{2D5ABB26-0587-4C30-8999-92F81FD0307C}</a:tableStyleId>
+              </a:tblPr>
+              <a:tblGrid>
+                <a:gridCol w="4114800">
+                  <a:extLst>
+                    <a:ext uri="{9D8B030D-6E8A-4147-A177-3AD203B41FA5}">
+                      <a16:colId xmlns:a16="http://schemas.microsoft.com/office/drawing/2014/main" val="912787526"/>
+                    </a:ext>
+                  </a:extLst>
+                </a:gridCol>
+                <a:gridCol w="4114800">
+                  <a:extLst>
+                    <a:ext uri="{9D8B030D-6E8A-4147-A177-3AD203B41FA5}">
+                      <a16:colId xmlns:a16="http://schemas.microsoft.com/office/drawing/2014/main" val="578839179"/>
+                    </a:ext>
+                  </a:extLst>
+                </a:gridCol>
+              </a:tblGrid>
+              <a:tr h="2481502">
+                <a:tc>
+                  <a:txBody>
+                    <a:bodyPr/>
+                    <a:lstStyle/>
+                    <a:p>
+                      <a:endParaRPr lang="es-ES" dirty="0"/>
+                    </a:p>
+                  </a:txBody>
+                  <a:tcPr>
+                    <a:lnL w="28575" cap="flat" cmpd="sng" algn="ctr">
+                      <a:solidFill>
+                        <a:schemeClr val="accent3">
+                          <a:lumMod val="75000"/>
+                        </a:schemeClr>
+                      </a:solidFill>
+                      <a:prstDash val="sysDash"/>
+                      <a:round/>
+                      <a:headEnd type="none" w="med" len="med"/>
+                      <a:tailEnd type="none" w="med" len="med"/>
+                    </a:lnL>
+                    <a:lnR w="28575" cap="flat" cmpd="sng" algn="ctr">
+                      <a:solidFill>
+                        <a:schemeClr val="accent3">
+                          <a:lumMod val="75000"/>
+                        </a:schemeClr>
+                      </a:solidFill>
+                      <a:prstDash val="sysDash"/>
+                      <a:round/>
+                      <a:headEnd type="none" w="med" len="med"/>
+                      <a:tailEnd type="none" w="med" len="med"/>
+                    </a:lnR>
+                    <a:lnT w="28575" cap="flat" cmpd="sng" algn="ctr">
+                      <a:solidFill>
+                        <a:schemeClr val="accent3">
+                          <a:lumMod val="75000"/>
+                        </a:schemeClr>
+                      </a:solidFill>
+                      <a:prstDash val="sysDash"/>
+                      <a:round/>
+                      <a:headEnd type="none" w="med" len="med"/>
+                      <a:tailEnd type="none" w="med" len="med"/>
+                    </a:lnT>
+                    <a:lnB w="28575" cap="flat" cmpd="sng" algn="ctr">
+                      <a:solidFill>
+                        <a:schemeClr val="accent3">
+                          <a:lumMod val="75000"/>
+                        </a:schemeClr>
+                      </a:solidFill>
+                      <a:prstDash val="sysDash"/>
+                      <a:round/>
+                      <a:headEnd type="none" w="med" len="med"/>
+                      <a:tailEnd type="none" w="med" len="med"/>
+                    </a:lnB>
+                    <a:lnTlToBr w="12700" cmpd="sng">
+                      <a:noFill/>
+                      <a:prstDash val="solid"/>
+                    </a:lnTlToBr>
+                    <a:lnBlToTr w="12700" cmpd="sng">
+                      <a:noFill/>
+                      <a:prstDash val="solid"/>
+                    </a:lnBlToTr>
+                  </a:tcPr>
+                </a:tc>
+                <a:tc>
+                  <a:txBody>
+                    <a:bodyPr/>
+                    <a:lstStyle/>
+                    <a:p>
+                      <a:endParaRPr lang="es-ES" dirty="0"/>
+                    </a:p>
+                  </a:txBody>
+                  <a:tcPr>
+                    <a:lnL w="28575" cap="flat" cmpd="sng" algn="ctr">
+                      <a:solidFill>
+                        <a:schemeClr val="accent3">
+                          <a:lumMod val="75000"/>
+                        </a:schemeClr>
+                      </a:solidFill>
+                      <a:prstDash val="sysDash"/>
+                      <a:round/>
+                      <a:headEnd type="none" w="med" len="med"/>
+                      <a:tailEnd type="none" w="med" len="med"/>
+                    </a:lnL>
+                    <a:lnR w="28575" cap="flat" cmpd="sng" algn="ctr">
+                      <a:solidFill>
+                        <a:schemeClr val="accent3">
+                          <a:lumMod val="75000"/>
+                        </a:schemeClr>
+                      </a:solidFill>
+                      <a:prstDash val="sysDash"/>
+                      <a:round/>
+                      <a:headEnd type="none" w="med" len="med"/>
+                      <a:tailEnd type="none" w="med" len="med"/>
+                    </a:lnR>
+                    <a:lnT w="28575" cap="flat" cmpd="sng" algn="ctr">
+                      <a:solidFill>
+                        <a:schemeClr val="accent3">
+                          <a:lumMod val="75000"/>
+                        </a:schemeClr>
+                      </a:solidFill>
+                      <a:prstDash val="sysDash"/>
+                      <a:round/>
+                      <a:headEnd type="none" w="med" len="med"/>
+                      <a:tailEnd type="none" w="med" len="med"/>
+                    </a:lnT>
+                    <a:lnB w="28575" cap="flat" cmpd="sng" algn="ctr">
+                      <a:solidFill>
+                        <a:schemeClr val="accent3">
+                          <a:lumMod val="75000"/>
+                        </a:schemeClr>
+                      </a:solidFill>
+                      <a:prstDash val="sysDash"/>
+                      <a:round/>
+                      <a:headEnd type="none" w="med" len="med"/>
+                      <a:tailEnd type="none" w="med" len="med"/>
+                    </a:lnB>
+                    <a:lnTlToBr w="12700" cmpd="sng">
+                      <a:noFill/>
+                      <a:prstDash val="solid"/>
+                    </a:lnTlToBr>
+                    <a:lnBlToTr w="12700" cmpd="sng">
+                      <a:noFill/>
+                      <a:prstDash val="solid"/>
+                    </a:lnBlToTr>
+                  </a:tcPr>
+                </a:tc>
+                <a:extLst>
+                  <a:ext uri="{0D108BD9-81ED-4DB2-BD59-A6C34878D82A}">
+                    <a16:rowId xmlns:a16="http://schemas.microsoft.com/office/drawing/2014/main" val="2486278510"/>
+                  </a:ext>
+                </a:extLst>
+              </a:tr>
+              <a:tr h="2481502">
+                <a:tc>
+                  <a:txBody>
+                    <a:bodyPr/>
+                    <a:lstStyle/>
+                    <a:p>
+                      <a:endParaRPr lang="es-ES" dirty="0"/>
+                    </a:p>
+                  </a:txBody>
+                  <a:tcPr>
+                    <a:lnL w="28575" cap="flat" cmpd="sng" algn="ctr">
+                      <a:solidFill>
+                        <a:schemeClr val="accent3">
+                          <a:lumMod val="75000"/>
+                        </a:schemeClr>
+                      </a:solidFill>
+                      <a:prstDash val="sysDash"/>
+                      <a:round/>
+                      <a:headEnd type="none" w="med" len="med"/>
+                      <a:tailEnd type="none" w="med" len="med"/>
+                    </a:lnL>
+                    <a:lnR w="28575" cap="flat" cmpd="sng" algn="ctr">
+                      <a:solidFill>
+                        <a:schemeClr val="accent3">
+                          <a:lumMod val="75000"/>
+                        </a:schemeClr>
+                      </a:solidFill>
+                      <a:prstDash val="sysDash"/>
+                      <a:round/>
+                      <a:headEnd type="none" w="med" len="med"/>
+                      <a:tailEnd type="none" w="med" len="med"/>
+                    </a:lnR>
+                    <a:lnT w="28575" cap="flat" cmpd="sng" algn="ctr">
+                      <a:solidFill>
+                        <a:schemeClr val="accent3">
+                          <a:lumMod val="75000"/>
+                        </a:schemeClr>
+                      </a:solidFill>
+                      <a:prstDash val="sysDash"/>
+                      <a:round/>
+                      <a:headEnd type="none" w="med" len="med"/>
+                      <a:tailEnd type="none" w="med" len="med"/>
+                    </a:lnT>
+                    <a:lnB w="28575" cap="flat" cmpd="sng" algn="ctr">
+                      <a:solidFill>
+                        <a:schemeClr val="accent3">
+                          <a:lumMod val="75000"/>
+                        </a:schemeClr>
+                      </a:solidFill>
+                      <a:prstDash val="sysDash"/>
+                      <a:round/>
+                      <a:headEnd type="none" w="med" len="med"/>
+                      <a:tailEnd type="none" w="med" len="med"/>
+                    </a:lnB>
+                    <a:lnTlToBr w="12700" cmpd="sng">
+                      <a:noFill/>
+                      <a:prstDash val="solid"/>
+                    </a:lnTlToBr>
+                    <a:lnBlToTr w="12700" cmpd="sng">
+                      <a:noFill/>
+                      <a:prstDash val="solid"/>
+                    </a:lnBlToTr>
+                  </a:tcPr>
+                </a:tc>
+                <a:tc>
+                  <a:txBody>
+                    <a:bodyPr/>
+                    <a:lstStyle/>
+                    <a:p>
+                      <a:endParaRPr lang="es-ES" dirty="0"/>
+                    </a:p>
+                    <a:p>
+                      <a:endParaRPr lang="es-ES" dirty="0"/>
+                    </a:p>
+                  </a:txBody>
+                  <a:tcPr>
+                    <a:lnL w="28575" cap="flat" cmpd="sng" algn="ctr">
+                      <a:solidFill>
+                        <a:schemeClr val="accent3">
+                          <a:lumMod val="75000"/>
+                        </a:schemeClr>
+                      </a:solidFill>
+                      <a:prstDash val="sysDash"/>
+                      <a:round/>
+                      <a:headEnd type="none" w="med" len="med"/>
+                      <a:tailEnd type="none" w="med" len="med"/>
+                    </a:lnL>
+                    <a:lnR w="28575" cap="flat" cmpd="sng" algn="ctr">
+                      <a:solidFill>
+                        <a:schemeClr val="accent3">
+                          <a:lumMod val="75000"/>
+                        </a:schemeClr>
+                      </a:solidFill>
+                      <a:prstDash val="sysDash"/>
+                      <a:round/>
+                      <a:headEnd type="none" w="med" len="med"/>
+                      <a:tailEnd type="none" w="med" len="med"/>
+                    </a:lnR>
+                    <a:lnT w="28575" cap="flat" cmpd="sng" algn="ctr">
+                      <a:solidFill>
+                        <a:schemeClr val="accent3">
+                          <a:lumMod val="75000"/>
+                        </a:schemeClr>
+                      </a:solidFill>
+                      <a:prstDash val="sysDash"/>
+                      <a:round/>
+                      <a:headEnd type="none" w="med" len="med"/>
+                      <a:tailEnd type="none" w="med" len="med"/>
+                    </a:lnT>
+                    <a:lnB w="28575" cap="flat" cmpd="sng" algn="ctr">
+                      <a:solidFill>
+                        <a:schemeClr val="accent3">
+                          <a:lumMod val="75000"/>
+                        </a:schemeClr>
+                      </a:solidFill>
+                      <a:prstDash val="sysDash"/>
+                      <a:round/>
+                      <a:headEnd type="none" w="med" len="med"/>
+                      <a:tailEnd type="none" w="med" len="med"/>
+                    </a:lnB>
+                    <a:lnTlToBr w="12700" cmpd="sng">
+                      <a:noFill/>
+                      <a:prstDash val="solid"/>
+                    </a:lnTlToBr>
+                    <a:lnBlToTr w="12700" cmpd="sng">
+                      <a:noFill/>
+                      <a:prstDash val="solid"/>
+                    </a:lnBlToTr>
+                  </a:tcPr>
+                </a:tc>
+                <a:extLst>
+                  <a:ext uri="{0D108BD9-81ED-4DB2-BD59-A6C34878D82A}">
+                    <a16:rowId xmlns:a16="http://schemas.microsoft.com/office/drawing/2014/main" val="148450392"/>
+                  </a:ext>
+                </a:extLst>
+              </a:tr>
+            </a:tbl>
+          </a:graphicData>
+        </a:graphic>
+      </p:graphicFrame>
+      <p:sp>
+        <p:nvSpPr>
           <p:cNvPr id="4" name="Marcador de contenido 3">
             <a:extLst>
               <a:ext uri="{FF2B5EF4-FFF2-40B4-BE49-F238E27FC236}">
@@ -4618,34 +4863,18 @@
         </p:nvSpPr>
         <p:spPr>
           <a:xfrm>
-            <a:off x="1043608" y="404664"/>
-            <a:ext cx="7056784" cy="5323730"/>
+            <a:off x="533400" y="1844824"/>
+            <a:ext cx="4038600" cy="2116832"/>
           </a:xfrm>
         </p:spPr>
         <p:txBody>
           <a:bodyPr>
-            <a:normAutofit/>
+            <a:normAutofit fontScale="92500" lnSpcReduction="10000"/>
           </a:bodyPr>
           <a:lstStyle/>
           <a:p>
-            <a:pPr lvl="1"/>
-            <a:r>
-              <a:rPr lang="es-ES" sz="2800" dirty="0" err="1">
-                <a:solidFill>
-                  <a:srgbClr val="FFC000"/>
-                </a:solidFill>
-                <a:effectLst>
-                  <a:outerShdw blurRad="38100" dist="38100" dir="2700000" algn="tl">
-                    <a:srgbClr val="000000">
-                      <a:alpha val="43137"/>
-                    </a:srgbClr>
-                  </a:outerShdw>
-                </a:effectLst>
-              </a:rPr>
-              <a:t>size</a:t>
-            </a:r>
-            <a:r>
-              <a:rPr lang="es-ES" sz="2800" dirty="0">
+            <a:r>
+              <a:rPr lang="es-ES" dirty="0">
                 <a:solidFill>
                   <a:schemeClr val="bg1">
                     <a:lumMod val="95000"/>
@@ -4659,10 +4888,46 @@
                   </a:outerShdw>
                 </a:effectLst>
               </a:rPr>
-              <a:t> = “unidad de medida” tamaño inicial de control, para el campo texto y </a:t>
-            </a:r>
-            <a:r>
-              <a:rPr lang="es-ES" sz="2800" dirty="0" err="1">
+              <a:t>Ordenadas</a:t>
+            </a:r>
+          </a:p>
+          <a:p>
+            <a:pPr lvl="1"/>
+            <a:r>
+              <a:rPr lang="es-ES" dirty="0" err="1">
+                <a:solidFill>
+                  <a:srgbClr val="FFFF00"/>
+                </a:solidFill>
+                <a:effectLst>
+                  <a:outerShdw blurRad="38100" dist="38100" dir="2700000" algn="tl">
+                    <a:srgbClr val="000000">
+                      <a:alpha val="43137"/>
+                    </a:srgbClr>
+                  </a:outerShdw>
+                </a:effectLst>
+              </a:rPr>
+              <a:t>ol</a:t>
+            </a:r>
+            <a:r>
+              <a:rPr lang="es-ES" dirty="0">
+                <a:solidFill>
+                  <a:srgbClr val="FFFF00"/>
+                </a:solidFill>
+                <a:effectLst>
+                  <a:outerShdw blurRad="38100" dist="38100" dir="2700000" algn="tl">
+                    <a:srgbClr val="000000">
+                      <a:alpha val="43137"/>
+                    </a:srgbClr>
+                  </a:outerShdw>
+                </a:effectLst>
+              </a:rPr>
+              <a:t> </a:t>
+            </a:r>
+          </a:p>
+          <a:p>
+            <a:pPr lvl="2"/>
+            <a:r>
+              <a:rPr lang="es-ES" dirty="0" err="1">
                 <a:solidFill>
                   <a:schemeClr val="bg1">
                     <a:lumMod val="95000"/>
@@ -4676,10 +4941,10 @@
                   </a:outerShdw>
                 </a:effectLst>
               </a:rPr>
-              <a:t>password</a:t>
-            </a:r>
-            <a:r>
-              <a:rPr lang="es-ES" sz="2800" dirty="0">
+              <a:t>type</a:t>
+            </a:r>
+            <a:r>
+              <a:rPr lang="es-ES" dirty="0">
                 <a:solidFill>
                   <a:schemeClr val="bg1">
                     <a:lumMod val="95000"/>
@@ -4693,28 +4958,13 @@
                   </a:outerShdw>
                 </a:effectLst>
               </a:rPr>
-              <a:t> en caracteres los demás son en pixeles</a:t>
-            </a:r>
-          </a:p>
-          <a:p>
-            <a:pPr lvl="1"/>
-            <a:r>
-              <a:rPr lang="es-ES" sz="2800" dirty="0" err="1">
-                <a:solidFill>
-                  <a:srgbClr val="FFC000"/>
-                </a:solidFill>
-                <a:effectLst>
-                  <a:outerShdw blurRad="38100" dist="38100" dir="2700000" algn="tl">
-                    <a:srgbClr val="000000">
-                      <a:alpha val="43137"/>
-                    </a:srgbClr>
-                  </a:outerShdw>
-                </a:effectLst>
-              </a:rPr>
-              <a:t>maxlength</a:t>
-            </a:r>
-            <a:r>
-              <a:rPr lang="es-ES" sz="2800" dirty="0">
+              <a:t> = 1, a, A, i, I</a:t>
+            </a:r>
+          </a:p>
+          <a:p>
+            <a:pPr lvl="2"/>
+            <a:r>
+              <a:rPr lang="es-ES" dirty="0" err="1">
                 <a:solidFill>
                   <a:schemeClr val="bg1">
                     <a:lumMod val="95000"/>
@@ -4728,179 +4978,8 @@
                   </a:outerShdw>
                 </a:effectLst>
               </a:rPr>
-              <a:t> = “numero” máximo de numero de caracteres</a:t>
-            </a:r>
-            <a:endParaRPr lang="es-ES" sz="2800" dirty="0">
-              <a:solidFill>
-                <a:srgbClr val="FFFF00"/>
-              </a:solidFill>
-              <a:effectLst>
-                <a:outerShdw blurRad="38100" dist="38100" dir="2700000" algn="tl">
-                  <a:srgbClr val="000000">
-                    <a:alpha val="43137"/>
-                  </a:srgbClr>
-                </a:outerShdw>
-              </a:effectLst>
-            </a:endParaRPr>
-          </a:p>
-          <a:p>
-            <a:r>
-              <a:rPr lang="en-US" dirty="0" err="1">
-                <a:solidFill>
-                  <a:srgbClr val="FFFF00"/>
-                </a:solidFill>
-              </a:rPr>
-              <a:t>fieldset</a:t>
-            </a:r>
-            <a:r>
-              <a:rPr lang="en-US" dirty="0">
-                <a:solidFill>
-                  <a:srgbClr val="FFFF00"/>
-                </a:solidFill>
-              </a:rPr>
-              <a:t> </a:t>
-            </a:r>
-            <a:r>
-              <a:rPr lang="en-US" dirty="0">
-                <a:solidFill>
-                  <a:schemeClr val="bg1"/>
-                </a:solidFill>
-              </a:rPr>
-              <a:t>= </a:t>
-            </a:r>
-            <a:r>
-              <a:rPr lang="es-MX" noProof="1">
-                <a:solidFill>
-                  <a:schemeClr val="bg1"/>
-                </a:solidFill>
-              </a:rPr>
-              <a:t>sirve</a:t>
-            </a:r>
-            <a:r>
-              <a:rPr lang="en-US" dirty="0">
-                <a:solidFill>
-                  <a:schemeClr val="bg1"/>
-                </a:solidFill>
-              </a:rPr>
-              <a:t> para </a:t>
-            </a:r>
-            <a:r>
-              <a:rPr lang="es-MX" dirty="0">
-                <a:solidFill>
-                  <a:schemeClr val="bg1"/>
-                </a:solidFill>
-              </a:rPr>
-              <a:t>agrupar</a:t>
-            </a:r>
-            <a:r>
-              <a:rPr lang="en-US" dirty="0">
-                <a:solidFill>
-                  <a:schemeClr val="bg1"/>
-                </a:solidFill>
-              </a:rPr>
-              <a:t> </a:t>
-            </a:r>
-            <a:r>
-              <a:rPr lang="en-US" dirty="0" err="1">
-                <a:solidFill>
-                  <a:schemeClr val="bg1"/>
-                </a:solidFill>
-              </a:rPr>
-              <a:t>contenido</a:t>
-            </a:r>
-            <a:r>
-              <a:rPr lang="en-US" dirty="0">
-                <a:solidFill>
-                  <a:schemeClr val="bg1"/>
-                </a:solidFill>
-              </a:rPr>
-              <a:t> </a:t>
-            </a:r>
-            <a:r>
-              <a:rPr lang="en-US" dirty="0" err="1">
-                <a:solidFill>
-                  <a:schemeClr val="bg1"/>
-                </a:solidFill>
-              </a:rPr>
-              <a:t>relacionado</a:t>
-            </a:r>
-            <a:endParaRPr lang="en-US" dirty="0">
-              <a:solidFill>
-                <a:srgbClr val="FFFF00"/>
-              </a:solidFill>
-            </a:endParaRPr>
-          </a:p>
-          <a:p>
-            <a:r>
-              <a:rPr lang="en-US" dirty="0">
-                <a:solidFill>
-                  <a:srgbClr val="FFFF00"/>
-                </a:solidFill>
-              </a:rPr>
-              <a:t>legend </a:t>
-            </a:r>
-            <a:r>
-              <a:rPr lang="en-US" dirty="0">
-                <a:solidFill>
-                  <a:schemeClr val="bg1"/>
-                </a:solidFill>
-              </a:rPr>
-              <a:t>= </a:t>
-            </a:r>
-            <a:r>
-              <a:rPr lang="en-US" dirty="0" err="1">
-                <a:solidFill>
-                  <a:schemeClr val="bg1"/>
-                </a:solidFill>
-              </a:rPr>
-              <a:t>sirve</a:t>
-            </a:r>
-            <a:r>
-              <a:rPr lang="en-US" dirty="0">
-                <a:solidFill>
-                  <a:schemeClr val="bg1"/>
-                </a:solidFill>
-              </a:rPr>
-              <a:t> para </a:t>
-            </a:r>
-            <a:r>
-              <a:rPr lang="en-US" dirty="0" err="1">
-                <a:solidFill>
-                  <a:schemeClr val="bg1"/>
-                </a:solidFill>
-              </a:rPr>
-              <a:t>poner</a:t>
-            </a:r>
-            <a:r>
-              <a:rPr lang="en-US" dirty="0">
-                <a:solidFill>
-                  <a:schemeClr val="bg1"/>
-                </a:solidFill>
-              </a:rPr>
-              <a:t> un </a:t>
-            </a:r>
-            <a:r>
-              <a:rPr lang="en-US">
-                <a:solidFill>
-                  <a:schemeClr val="bg1"/>
-                </a:solidFill>
-              </a:rPr>
-              <a:t>letrero</a:t>
-            </a:r>
-            <a:endParaRPr lang="en-US" dirty="0">
-              <a:solidFill>
-                <a:srgbClr val="FFFF00"/>
-              </a:solidFill>
-            </a:endParaRPr>
-          </a:p>
-          <a:p>
-            <a:endParaRPr lang="en-US" dirty="0">
-              <a:solidFill>
-                <a:srgbClr val="FFFF00"/>
-              </a:solidFill>
-            </a:endParaRPr>
-          </a:p>
-          <a:p>
+              <a:t>reversed</a:t>
+            </a:r>
             <a:endParaRPr lang="es-ES" dirty="0">
               <a:solidFill>
                 <a:schemeClr val="bg1">
@@ -4917,7 +4996,24 @@
             </a:endParaRPr>
           </a:p>
           <a:p>
-            <a:pPr lvl="1"/>
+            <a:pPr lvl="2"/>
+            <a:r>
+              <a:rPr lang="es-ES" dirty="0" err="1">
+                <a:solidFill>
+                  <a:schemeClr val="bg1">
+                    <a:lumMod val="95000"/>
+                  </a:schemeClr>
+                </a:solidFill>
+                <a:effectLst>
+                  <a:outerShdw blurRad="38100" dist="38100" dir="2700000" algn="tl">
+                    <a:srgbClr val="000000">
+                      <a:alpha val="43137"/>
+                    </a:srgbClr>
+                  </a:outerShdw>
+                </a:effectLst>
+              </a:rPr>
+              <a:t>start</a:t>
+            </a:r>
             <a:endParaRPr lang="es-ES" dirty="0">
               <a:solidFill>
                 <a:schemeClr val="bg1">
@@ -4933,12 +5029,807 @@
               </a:effectLst>
             </a:endParaRPr>
           </a:p>
+          <a:p>
+            <a:pPr lvl="2"/>
+            <a:r>
+              <a:rPr lang="es-ES" dirty="0" err="1">
+                <a:solidFill>
+                  <a:srgbClr val="FFFF00"/>
+                </a:solidFill>
+                <a:effectLst>
+                  <a:outerShdw blurRad="38100" dist="38100" dir="2700000" algn="tl">
+                    <a:srgbClr val="000000">
+                      <a:alpha val="43137"/>
+                    </a:srgbClr>
+                  </a:outerShdw>
+                </a:effectLst>
+              </a:rPr>
+              <a:t>li</a:t>
+            </a:r>
+            <a:endParaRPr lang="es-ES" dirty="0">
+              <a:solidFill>
+                <a:srgbClr val="FFFF00"/>
+              </a:solidFill>
+              <a:effectLst>
+                <a:outerShdw blurRad="38100" dist="38100" dir="2700000" algn="tl">
+                  <a:srgbClr val="000000">
+                    <a:alpha val="43137"/>
+                  </a:srgbClr>
+                </a:outerShdw>
+              </a:effectLst>
+            </a:endParaRPr>
+          </a:p>
+        </p:txBody>
+      </p:sp>
+      <p:sp>
+        <p:nvSpPr>
+          <p:cNvPr id="5" name="Marcador de contenido 4">
+            <a:extLst>
+              <a:ext uri="{FF2B5EF4-FFF2-40B4-BE49-F238E27FC236}">
+                <a16:creationId xmlns:a16="http://schemas.microsoft.com/office/drawing/2014/main" id="{B9A802B3-F0E8-4363-9FEF-BD5CF12E5181}"/>
+              </a:ext>
+            </a:extLst>
+          </p:cNvPr>
+          <p:cNvSpPr>
+            <a:spLocks noGrp="1"/>
+          </p:cNvSpPr>
+          <p:nvPr>
+            <p:ph sz="half" idx="2"/>
+          </p:nvPr>
+        </p:nvSpPr>
+        <p:spPr>
+          <a:xfrm>
+            <a:off x="4572000" y="1844824"/>
+            <a:ext cx="4038600" cy="2116832"/>
+          </a:xfrm>
+        </p:spPr>
+        <p:txBody>
+          <a:bodyPr>
+            <a:normAutofit fontScale="92500" lnSpcReduction="10000"/>
+          </a:bodyPr>
+          <a:lstStyle/>
+          <a:p>
+            <a:r>
+              <a:rPr lang="es-ES" dirty="0">
+                <a:solidFill>
+                  <a:schemeClr val="bg1">
+                    <a:lumMod val="95000"/>
+                  </a:schemeClr>
+                </a:solidFill>
+                <a:effectLst>
+                  <a:outerShdw blurRad="38100" dist="38100" dir="2700000" algn="tl">
+                    <a:srgbClr val="000000">
+                      <a:alpha val="43137"/>
+                    </a:srgbClr>
+                  </a:outerShdw>
+                </a:effectLst>
+              </a:rPr>
+              <a:t>Desordenadas</a:t>
+            </a:r>
+          </a:p>
+          <a:p>
+            <a:pPr lvl="1"/>
+            <a:r>
+              <a:rPr lang="es-ES" dirty="0" err="1">
+                <a:solidFill>
+                  <a:srgbClr val="FFFF00"/>
+                </a:solidFill>
+                <a:effectLst>
+                  <a:outerShdw blurRad="38100" dist="38100" dir="2700000" algn="tl">
+                    <a:srgbClr val="000000">
+                      <a:alpha val="43137"/>
+                    </a:srgbClr>
+                  </a:outerShdw>
+                </a:effectLst>
+              </a:rPr>
+              <a:t>ul</a:t>
+            </a:r>
+            <a:endParaRPr lang="es-ES" dirty="0">
+              <a:solidFill>
+                <a:srgbClr val="FFFF00"/>
+              </a:solidFill>
+              <a:effectLst>
+                <a:outerShdw blurRad="38100" dist="38100" dir="2700000" algn="tl">
+                  <a:srgbClr val="000000">
+                    <a:alpha val="43137"/>
+                  </a:srgbClr>
+                </a:outerShdw>
+              </a:effectLst>
+            </a:endParaRPr>
+          </a:p>
+          <a:p>
+            <a:pPr lvl="2"/>
+            <a:r>
+              <a:rPr lang="es-ES" dirty="0">
+                <a:solidFill>
+                  <a:schemeClr val="bg1">
+                    <a:lumMod val="95000"/>
+                  </a:schemeClr>
+                </a:solidFill>
+                <a:effectLst>
+                  <a:outerShdw blurRad="38100" dist="38100" dir="2700000" algn="tl">
+                    <a:srgbClr val="000000">
+                      <a:alpha val="43137"/>
+                    </a:srgbClr>
+                  </a:outerShdw>
+                </a:effectLst>
+              </a:rPr>
+              <a:t>trabaja con </a:t>
+            </a:r>
+            <a:r>
+              <a:rPr lang="es-ES" dirty="0" err="1">
+                <a:solidFill>
+                  <a:schemeClr val="bg1">
+                    <a:lumMod val="95000"/>
+                  </a:schemeClr>
+                </a:solidFill>
+                <a:effectLst>
+                  <a:outerShdw blurRad="38100" dist="38100" dir="2700000" algn="tl">
+                    <a:srgbClr val="000000">
+                      <a:alpha val="43137"/>
+                    </a:srgbClr>
+                  </a:outerShdw>
+                </a:effectLst>
+              </a:rPr>
+              <a:t>li</a:t>
+            </a:r>
+            <a:endParaRPr lang="es-ES" dirty="0">
+              <a:solidFill>
+                <a:schemeClr val="bg1">
+                  <a:lumMod val="95000"/>
+                </a:schemeClr>
+              </a:solidFill>
+              <a:effectLst>
+                <a:outerShdw blurRad="38100" dist="38100" dir="2700000" algn="tl">
+                  <a:srgbClr val="000000">
+                    <a:alpha val="43137"/>
+                  </a:srgbClr>
+                </a:outerShdw>
+              </a:effectLst>
+            </a:endParaRPr>
+          </a:p>
+          <a:p>
+            <a:endParaRPr lang="es-ES" dirty="0">
+              <a:solidFill>
+                <a:schemeClr val="bg1">
+                  <a:lumMod val="95000"/>
+                </a:schemeClr>
+              </a:solidFill>
+              <a:effectLst>
+                <a:outerShdw blurRad="38100" dist="38100" dir="2700000" algn="tl">
+                  <a:srgbClr val="000000">
+                    <a:alpha val="43137"/>
+                  </a:srgbClr>
+                </a:outerShdw>
+              </a:effectLst>
+            </a:endParaRPr>
+          </a:p>
+        </p:txBody>
+      </p:sp>
+      <p:sp>
+        <p:nvSpPr>
+          <p:cNvPr id="8" name="Marcador de contenido 3">
+            <a:extLst>
+              <a:ext uri="{FF2B5EF4-FFF2-40B4-BE49-F238E27FC236}">
+                <a16:creationId xmlns:a16="http://schemas.microsoft.com/office/drawing/2014/main" id="{01D3425C-1B8D-4CDC-9AEB-099553AFD475}"/>
+              </a:ext>
+            </a:extLst>
+          </p:cNvPr>
+          <p:cNvSpPr txBox="1">
+            <a:spLocks/>
+          </p:cNvSpPr>
+          <p:nvPr/>
+        </p:nvSpPr>
+        <p:spPr>
+          <a:xfrm>
+            <a:off x="533400" y="4214093"/>
+            <a:ext cx="4038600" cy="2116832"/>
+          </a:xfrm>
+          <a:prstGeom prst="rect">
+            <a:avLst/>
+          </a:prstGeom>
+        </p:spPr>
+        <p:txBody>
+          <a:bodyPr vert="horz" lIns="91440" tIns="45720" rIns="91440" bIns="45720" rtlCol="0">
+            <a:normAutofit/>
+          </a:bodyPr>
+          <a:lstStyle>
+            <a:lvl1pPr marL="342900" indent="-342900" algn="l" defTabSz="914400" rtl="0" eaLnBrk="1" latinLnBrk="0" hangingPunct="1">
+              <a:spcBef>
+                <a:spcPct val="20000"/>
+              </a:spcBef>
+              <a:buFont typeface="Arial" panose="020B0604020202020204" pitchFamily="34" charset="0"/>
+              <a:buChar char="•"/>
+              <a:defRPr sz="2800" kern="1200">
+                <a:solidFill>
+                  <a:schemeClr val="tx1"/>
+                </a:solidFill>
+                <a:latin typeface="+mn-lt"/>
+                <a:ea typeface="+mn-ea"/>
+                <a:cs typeface="+mn-cs"/>
+              </a:defRPr>
+            </a:lvl1pPr>
+            <a:lvl2pPr marL="742950" indent="-285750" algn="l" defTabSz="914400" rtl="0" eaLnBrk="1" latinLnBrk="0" hangingPunct="1">
+              <a:spcBef>
+                <a:spcPct val="20000"/>
+              </a:spcBef>
+              <a:buFont typeface="Arial" panose="020B0604020202020204" pitchFamily="34" charset="0"/>
+              <a:buChar char="–"/>
+              <a:defRPr sz="2400" kern="1200">
+                <a:solidFill>
+                  <a:schemeClr val="tx1"/>
+                </a:solidFill>
+                <a:latin typeface="+mn-lt"/>
+                <a:ea typeface="+mn-ea"/>
+                <a:cs typeface="+mn-cs"/>
+              </a:defRPr>
+            </a:lvl2pPr>
+            <a:lvl3pPr marL="1143000" indent="-228600" algn="l" defTabSz="914400" rtl="0" eaLnBrk="1" latinLnBrk="0" hangingPunct="1">
+              <a:spcBef>
+                <a:spcPct val="20000"/>
+              </a:spcBef>
+              <a:buFont typeface="Arial" panose="020B0604020202020204" pitchFamily="34" charset="0"/>
+              <a:buChar char="•"/>
+              <a:defRPr sz="2000" kern="1200">
+                <a:solidFill>
+                  <a:schemeClr val="tx1"/>
+                </a:solidFill>
+                <a:latin typeface="+mn-lt"/>
+                <a:ea typeface="+mn-ea"/>
+                <a:cs typeface="+mn-cs"/>
+              </a:defRPr>
+            </a:lvl3pPr>
+            <a:lvl4pPr marL="1600200" indent="-228600" algn="l" defTabSz="914400" rtl="0" eaLnBrk="1" latinLnBrk="0" hangingPunct="1">
+              <a:spcBef>
+                <a:spcPct val="20000"/>
+              </a:spcBef>
+              <a:buFont typeface="Arial" panose="020B0604020202020204" pitchFamily="34" charset="0"/>
+              <a:buChar char="–"/>
+              <a:defRPr sz="1800" kern="1200">
+                <a:solidFill>
+                  <a:schemeClr val="tx1"/>
+                </a:solidFill>
+                <a:latin typeface="+mn-lt"/>
+                <a:ea typeface="+mn-ea"/>
+                <a:cs typeface="+mn-cs"/>
+              </a:defRPr>
+            </a:lvl4pPr>
+            <a:lvl5pPr marL="2057400" indent="-228600" algn="l" defTabSz="914400" rtl="0" eaLnBrk="1" latinLnBrk="0" hangingPunct="1">
+              <a:spcBef>
+                <a:spcPct val="20000"/>
+              </a:spcBef>
+              <a:buFont typeface="Arial" panose="020B0604020202020204" pitchFamily="34" charset="0"/>
+              <a:buChar char="»"/>
+              <a:defRPr sz="1800" kern="1200">
+                <a:solidFill>
+                  <a:schemeClr val="tx1"/>
+                </a:solidFill>
+                <a:latin typeface="+mn-lt"/>
+                <a:ea typeface="+mn-ea"/>
+                <a:cs typeface="+mn-cs"/>
+              </a:defRPr>
+            </a:lvl5pPr>
+            <a:lvl6pPr marL="2514600" indent="-228600" algn="l" defTabSz="914400" rtl="0" eaLnBrk="1" latinLnBrk="0" hangingPunct="1">
+              <a:spcBef>
+                <a:spcPct val="20000"/>
+              </a:spcBef>
+              <a:buFont typeface="Arial" panose="020B0604020202020204" pitchFamily="34" charset="0"/>
+              <a:buChar char="•"/>
+              <a:defRPr sz="1800" kern="1200">
+                <a:solidFill>
+                  <a:schemeClr val="tx1"/>
+                </a:solidFill>
+                <a:latin typeface="+mn-lt"/>
+                <a:ea typeface="+mn-ea"/>
+                <a:cs typeface="+mn-cs"/>
+              </a:defRPr>
+            </a:lvl6pPr>
+            <a:lvl7pPr marL="2971800" indent="-228600" algn="l" defTabSz="914400" rtl="0" eaLnBrk="1" latinLnBrk="0" hangingPunct="1">
+              <a:spcBef>
+                <a:spcPct val="20000"/>
+              </a:spcBef>
+              <a:buFont typeface="Arial" panose="020B0604020202020204" pitchFamily="34" charset="0"/>
+              <a:buChar char="•"/>
+              <a:defRPr sz="1800" kern="1200">
+                <a:solidFill>
+                  <a:schemeClr val="tx1"/>
+                </a:solidFill>
+                <a:latin typeface="+mn-lt"/>
+                <a:ea typeface="+mn-ea"/>
+                <a:cs typeface="+mn-cs"/>
+              </a:defRPr>
+            </a:lvl7pPr>
+            <a:lvl8pPr marL="3429000" indent="-228600" algn="l" defTabSz="914400" rtl="0" eaLnBrk="1" latinLnBrk="0" hangingPunct="1">
+              <a:spcBef>
+                <a:spcPct val="20000"/>
+              </a:spcBef>
+              <a:buFont typeface="Arial" panose="020B0604020202020204" pitchFamily="34" charset="0"/>
+              <a:buChar char="•"/>
+              <a:defRPr sz="1800" kern="1200">
+                <a:solidFill>
+                  <a:schemeClr val="tx1"/>
+                </a:solidFill>
+                <a:latin typeface="+mn-lt"/>
+                <a:ea typeface="+mn-ea"/>
+                <a:cs typeface="+mn-cs"/>
+              </a:defRPr>
+            </a:lvl8pPr>
+            <a:lvl9pPr marL="3886200" indent="-228600" algn="l" defTabSz="914400" rtl="0" eaLnBrk="1" latinLnBrk="0" hangingPunct="1">
+              <a:spcBef>
+                <a:spcPct val="20000"/>
+              </a:spcBef>
+              <a:buFont typeface="Arial" panose="020B0604020202020204" pitchFamily="34" charset="0"/>
+              <a:buChar char="•"/>
+              <a:defRPr sz="1800" kern="1200">
+                <a:solidFill>
+                  <a:schemeClr val="tx1"/>
+                </a:solidFill>
+                <a:latin typeface="+mn-lt"/>
+                <a:ea typeface="+mn-ea"/>
+                <a:cs typeface="+mn-cs"/>
+              </a:defRPr>
+            </a:lvl9pPr>
+          </a:lstStyle>
+          <a:p>
+            <a:r>
+              <a:rPr lang="es-ES" dirty="0">
+                <a:solidFill>
+                  <a:schemeClr val="bg1">
+                    <a:lumMod val="95000"/>
+                  </a:schemeClr>
+                </a:solidFill>
+                <a:effectLst>
+                  <a:outerShdw blurRad="38100" dist="38100" dir="2700000" algn="tl">
+                    <a:srgbClr val="000000">
+                      <a:alpha val="43137"/>
+                    </a:srgbClr>
+                  </a:outerShdw>
+                </a:effectLst>
+              </a:rPr>
+              <a:t>Términos y descripciones</a:t>
+            </a:r>
+          </a:p>
+          <a:p>
+            <a:pPr lvl="1"/>
+            <a:r>
+              <a:rPr lang="es-ES" dirty="0">
+                <a:solidFill>
+                  <a:srgbClr val="FFFF00"/>
+                </a:solidFill>
+                <a:effectLst>
+                  <a:outerShdw blurRad="38100" dist="38100" dir="2700000" algn="tl">
+                    <a:srgbClr val="000000">
+                      <a:alpha val="43137"/>
+                    </a:srgbClr>
+                  </a:outerShdw>
+                </a:effectLst>
+              </a:rPr>
+              <a:t>dl</a:t>
+            </a:r>
+            <a:r>
+              <a:rPr lang="es-ES" dirty="0">
+                <a:solidFill>
+                  <a:schemeClr val="bg1">
+                    <a:lumMod val="95000"/>
+                  </a:schemeClr>
+                </a:solidFill>
+                <a:effectLst>
+                  <a:outerShdw blurRad="38100" dist="38100" dir="2700000" algn="tl">
+                    <a:srgbClr val="000000">
+                      <a:alpha val="43137"/>
+                    </a:srgbClr>
+                  </a:outerShdw>
+                </a:effectLst>
+              </a:rPr>
+              <a:t> </a:t>
+            </a:r>
+          </a:p>
+          <a:p>
+            <a:pPr lvl="2"/>
+            <a:r>
+              <a:rPr lang="es-ES" dirty="0" err="1">
+                <a:solidFill>
+                  <a:srgbClr val="FFFF00"/>
+                </a:solidFill>
+                <a:effectLst>
+                  <a:outerShdw blurRad="38100" dist="38100" dir="2700000" algn="tl">
+                    <a:srgbClr val="000000">
+                      <a:alpha val="43137"/>
+                    </a:srgbClr>
+                  </a:outerShdw>
+                </a:effectLst>
+              </a:rPr>
+              <a:t>dt</a:t>
+            </a:r>
+            <a:endParaRPr lang="es-ES" dirty="0">
+              <a:solidFill>
+                <a:srgbClr val="FFFF00"/>
+              </a:solidFill>
+              <a:effectLst>
+                <a:outerShdw blurRad="38100" dist="38100" dir="2700000" algn="tl">
+                  <a:srgbClr val="000000">
+                    <a:alpha val="43137"/>
+                  </a:srgbClr>
+                </a:outerShdw>
+              </a:effectLst>
+            </a:endParaRPr>
+          </a:p>
+          <a:p>
+            <a:pPr lvl="2"/>
+            <a:r>
+              <a:rPr lang="es-ES" dirty="0" err="1">
+                <a:solidFill>
+                  <a:srgbClr val="FFFF00"/>
+                </a:solidFill>
+                <a:effectLst>
+                  <a:outerShdw blurRad="38100" dist="38100" dir="2700000" algn="tl">
+                    <a:srgbClr val="000000">
+                      <a:alpha val="43137"/>
+                    </a:srgbClr>
+                  </a:outerShdw>
+                </a:effectLst>
+              </a:rPr>
+              <a:t>dd</a:t>
+            </a:r>
+            <a:endParaRPr lang="es-ES" dirty="0">
+              <a:solidFill>
+                <a:srgbClr val="FFFF00"/>
+              </a:solidFill>
+              <a:effectLst>
+                <a:outerShdw blurRad="38100" dist="38100" dir="2700000" algn="tl">
+                  <a:srgbClr val="000000">
+                    <a:alpha val="43137"/>
+                  </a:srgbClr>
+                </a:outerShdw>
+              </a:effectLst>
+            </a:endParaRPr>
+          </a:p>
+        </p:txBody>
+      </p:sp>
+      <p:sp>
+        <p:nvSpPr>
+          <p:cNvPr id="9" name="Marcador de contenido 3">
+            <a:extLst>
+              <a:ext uri="{FF2B5EF4-FFF2-40B4-BE49-F238E27FC236}">
+                <a16:creationId xmlns:a16="http://schemas.microsoft.com/office/drawing/2014/main" id="{D382DD75-2640-4AC5-9D1F-E72D7024C7FC}"/>
+              </a:ext>
+            </a:extLst>
+          </p:cNvPr>
+          <p:cNvSpPr txBox="1">
+            <a:spLocks/>
+          </p:cNvSpPr>
+          <p:nvPr/>
+        </p:nvSpPr>
+        <p:spPr>
+          <a:xfrm>
+            <a:off x="4572000" y="4214093"/>
+            <a:ext cx="4038600" cy="2116832"/>
+          </a:xfrm>
+          <a:prstGeom prst="rect">
+            <a:avLst/>
+          </a:prstGeom>
+        </p:spPr>
+        <p:txBody>
+          <a:bodyPr vert="horz" lIns="91440" tIns="45720" rIns="91440" bIns="45720" rtlCol="0">
+            <a:normAutofit fontScale="92500" lnSpcReduction="20000"/>
+          </a:bodyPr>
+          <a:lstStyle>
+            <a:lvl1pPr marL="342900" indent="-342900" algn="l" defTabSz="914400" rtl="0" eaLnBrk="1" latinLnBrk="0" hangingPunct="1">
+              <a:spcBef>
+                <a:spcPct val="20000"/>
+              </a:spcBef>
+              <a:buFont typeface="Arial" panose="020B0604020202020204" pitchFamily="34" charset="0"/>
+              <a:buChar char="•"/>
+              <a:defRPr sz="2800" kern="1200">
+                <a:solidFill>
+                  <a:schemeClr val="tx1"/>
+                </a:solidFill>
+                <a:latin typeface="+mn-lt"/>
+                <a:ea typeface="+mn-ea"/>
+                <a:cs typeface="+mn-cs"/>
+              </a:defRPr>
+            </a:lvl1pPr>
+            <a:lvl2pPr marL="742950" indent="-285750" algn="l" defTabSz="914400" rtl="0" eaLnBrk="1" latinLnBrk="0" hangingPunct="1">
+              <a:spcBef>
+                <a:spcPct val="20000"/>
+              </a:spcBef>
+              <a:buFont typeface="Arial" panose="020B0604020202020204" pitchFamily="34" charset="0"/>
+              <a:buChar char="–"/>
+              <a:defRPr sz="2400" kern="1200">
+                <a:solidFill>
+                  <a:schemeClr val="tx1"/>
+                </a:solidFill>
+                <a:latin typeface="+mn-lt"/>
+                <a:ea typeface="+mn-ea"/>
+                <a:cs typeface="+mn-cs"/>
+              </a:defRPr>
+            </a:lvl2pPr>
+            <a:lvl3pPr marL="1143000" indent="-228600" algn="l" defTabSz="914400" rtl="0" eaLnBrk="1" latinLnBrk="0" hangingPunct="1">
+              <a:spcBef>
+                <a:spcPct val="20000"/>
+              </a:spcBef>
+              <a:buFont typeface="Arial" panose="020B0604020202020204" pitchFamily="34" charset="0"/>
+              <a:buChar char="•"/>
+              <a:defRPr sz="2000" kern="1200">
+                <a:solidFill>
+                  <a:schemeClr val="tx1"/>
+                </a:solidFill>
+                <a:latin typeface="+mn-lt"/>
+                <a:ea typeface="+mn-ea"/>
+                <a:cs typeface="+mn-cs"/>
+              </a:defRPr>
+            </a:lvl3pPr>
+            <a:lvl4pPr marL="1600200" indent="-228600" algn="l" defTabSz="914400" rtl="0" eaLnBrk="1" latinLnBrk="0" hangingPunct="1">
+              <a:spcBef>
+                <a:spcPct val="20000"/>
+              </a:spcBef>
+              <a:buFont typeface="Arial" panose="020B0604020202020204" pitchFamily="34" charset="0"/>
+              <a:buChar char="–"/>
+              <a:defRPr sz="1800" kern="1200">
+                <a:solidFill>
+                  <a:schemeClr val="tx1"/>
+                </a:solidFill>
+                <a:latin typeface="+mn-lt"/>
+                <a:ea typeface="+mn-ea"/>
+                <a:cs typeface="+mn-cs"/>
+              </a:defRPr>
+            </a:lvl4pPr>
+            <a:lvl5pPr marL="2057400" indent="-228600" algn="l" defTabSz="914400" rtl="0" eaLnBrk="1" latinLnBrk="0" hangingPunct="1">
+              <a:spcBef>
+                <a:spcPct val="20000"/>
+              </a:spcBef>
+              <a:buFont typeface="Arial" panose="020B0604020202020204" pitchFamily="34" charset="0"/>
+              <a:buChar char="»"/>
+              <a:defRPr sz="1800" kern="1200">
+                <a:solidFill>
+                  <a:schemeClr val="tx1"/>
+                </a:solidFill>
+                <a:latin typeface="+mn-lt"/>
+                <a:ea typeface="+mn-ea"/>
+                <a:cs typeface="+mn-cs"/>
+              </a:defRPr>
+            </a:lvl5pPr>
+            <a:lvl6pPr marL="2514600" indent="-228600" algn="l" defTabSz="914400" rtl="0" eaLnBrk="1" latinLnBrk="0" hangingPunct="1">
+              <a:spcBef>
+                <a:spcPct val="20000"/>
+              </a:spcBef>
+              <a:buFont typeface="Arial" panose="020B0604020202020204" pitchFamily="34" charset="0"/>
+              <a:buChar char="•"/>
+              <a:defRPr sz="1800" kern="1200">
+                <a:solidFill>
+                  <a:schemeClr val="tx1"/>
+                </a:solidFill>
+                <a:latin typeface="+mn-lt"/>
+                <a:ea typeface="+mn-ea"/>
+                <a:cs typeface="+mn-cs"/>
+              </a:defRPr>
+            </a:lvl6pPr>
+            <a:lvl7pPr marL="2971800" indent="-228600" algn="l" defTabSz="914400" rtl="0" eaLnBrk="1" latinLnBrk="0" hangingPunct="1">
+              <a:spcBef>
+                <a:spcPct val="20000"/>
+              </a:spcBef>
+              <a:buFont typeface="Arial" panose="020B0604020202020204" pitchFamily="34" charset="0"/>
+              <a:buChar char="•"/>
+              <a:defRPr sz="1800" kern="1200">
+                <a:solidFill>
+                  <a:schemeClr val="tx1"/>
+                </a:solidFill>
+                <a:latin typeface="+mn-lt"/>
+                <a:ea typeface="+mn-ea"/>
+                <a:cs typeface="+mn-cs"/>
+              </a:defRPr>
+            </a:lvl7pPr>
+            <a:lvl8pPr marL="3429000" indent="-228600" algn="l" defTabSz="914400" rtl="0" eaLnBrk="1" latinLnBrk="0" hangingPunct="1">
+              <a:spcBef>
+                <a:spcPct val="20000"/>
+              </a:spcBef>
+              <a:buFont typeface="Arial" panose="020B0604020202020204" pitchFamily="34" charset="0"/>
+              <a:buChar char="•"/>
+              <a:defRPr sz="1800" kern="1200">
+                <a:solidFill>
+                  <a:schemeClr val="tx1"/>
+                </a:solidFill>
+                <a:latin typeface="+mn-lt"/>
+                <a:ea typeface="+mn-ea"/>
+                <a:cs typeface="+mn-cs"/>
+              </a:defRPr>
+            </a:lvl8pPr>
+            <a:lvl9pPr marL="3886200" indent="-228600" algn="l" defTabSz="914400" rtl="0" eaLnBrk="1" latinLnBrk="0" hangingPunct="1">
+              <a:spcBef>
+                <a:spcPct val="20000"/>
+              </a:spcBef>
+              <a:buFont typeface="Arial" panose="020B0604020202020204" pitchFamily="34" charset="0"/>
+              <a:buChar char="•"/>
+              <a:defRPr sz="1800" kern="1200">
+                <a:solidFill>
+                  <a:schemeClr val="tx1"/>
+                </a:solidFill>
+                <a:latin typeface="+mn-lt"/>
+                <a:ea typeface="+mn-ea"/>
+                <a:cs typeface="+mn-cs"/>
+              </a:defRPr>
+            </a:lvl9pPr>
+          </a:lstStyle>
+          <a:p>
+            <a:r>
+              <a:rPr lang="es-ES" dirty="0">
+                <a:solidFill>
+                  <a:schemeClr val="bg1">
+                    <a:lumMod val="95000"/>
+                  </a:schemeClr>
+                </a:solidFill>
+                <a:effectLst>
+                  <a:outerShdw blurRad="38100" dist="38100" dir="2700000" algn="tl">
+                    <a:srgbClr val="000000">
+                      <a:alpha val="43137"/>
+                    </a:srgbClr>
+                  </a:outerShdw>
+                </a:effectLst>
+              </a:rPr>
+              <a:t>Otros</a:t>
+            </a:r>
+          </a:p>
+          <a:p>
+            <a:pPr lvl="1"/>
+            <a:r>
+              <a:rPr lang="es-ES" dirty="0" err="1">
+                <a:solidFill>
+                  <a:srgbClr val="FFFF00"/>
+                </a:solidFill>
+                <a:effectLst>
+                  <a:outerShdw blurRad="38100" dist="38100" dir="2700000" algn="tl">
+                    <a:srgbClr val="000000">
+                      <a:alpha val="43137"/>
+                    </a:srgbClr>
+                  </a:outerShdw>
+                </a:effectLst>
+              </a:rPr>
+              <a:t>blockquote</a:t>
+            </a:r>
+            <a:r>
+              <a:rPr lang="es-ES" dirty="0">
+                <a:solidFill>
+                  <a:schemeClr val="bg1">
+                    <a:lumMod val="95000"/>
+                  </a:schemeClr>
+                </a:solidFill>
+                <a:effectLst>
+                  <a:outerShdw blurRad="38100" dist="38100" dir="2700000" algn="tl">
+                    <a:srgbClr val="000000">
+                      <a:alpha val="43137"/>
+                    </a:srgbClr>
+                  </a:outerShdw>
+                </a:effectLst>
+              </a:rPr>
+              <a:t> = bloque de texto</a:t>
+            </a:r>
+          </a:p>
+          <a:p>
+            <a:pPr lvl="1"/>
+            <a:r>
+              <a:rPr lang="es-ES" dirty="0" err="1">
+                <a:solidFill>
+                  <a:srgbClr val="FFFF00"/>
+                </a:solidFill>
+                <a:effectLst>
+                  <a:outerShdw blurRad="38100" dist="38100" dir="2700000" algn="tl">
+                    <a:srgbClr val="000000">
+                      <a:alpha val="43137"/>
+                    </a:srgbClr>
+                  </a:outerShdw>
+                </a:effectLst>
+              </a:rPr>
+              <a:t>details</a:t>
+            </a:r>
+            <a:r>
+              <a:rPr lang="es-ES" dirty="0">
+                <a:solidFill>
+                  <a:schemeClr val="bg1">
+                    <a:lumMod val="95000"/>
+                  </a:schemeClr>
+                </a:solidFill>
+                <a:effectLst>
+                  <a:outerShdw blurRad="38100" dist="38100" dir="2700000" algn="tl">
+                    <a:srgbClr val="000000">
+                      <a:alpha val="43137"/>
+                    </a:srgbClr>
+                  </a:outerShdw>
+                </a:effectLst>
+              </a:rPr>
+              <a:t> =se expande</a:t>
+            </a:r>
+          </a:p>
+          <a:p>
+            <a:pPr lvl="2"/>
+            <a:r>
+              <a:rPr lang="es-ES" dirty="0" err="1">
+                <a:solidFill>
+                  <a:schemeClr val="bg1">
+                    <a:lumMod val="95000"/>
+                  </a:schemeClr>
+                </a:solidFill>
+                <a:effectLst>
+                  <a:outerShdw blurRad="38100" dist="38100" dir="2700000" algn="tl">
+                    <a:srgbClr val="000000">
+                      <a:alpha val="43137"/>
+                    </a:srgbClr>
+                  </a:outerShdw>
+                </a:effectLst>
+              </a:rPr>
+              <a:t>summary</a:t>
+            </a:r>
+            <a:endParaRPr lang="es-ES" dirty="0">
+              <a:solidFill>
+                <a:schemeClr val="bg1">
+                  <a:lumMod val="95000"/>
+                </a:schemeClr>
+              </a:solidFill>
+              <a:effectLst>
+                <a:outerShdw blurRad="38100" dist="38100" dir="2700000" algn="tl">
+                  <a:srgbClr val="000000">
+                    <a:alpha val="43137"/>
+                  </a:srgbClr>
+                </a:outerShdw>
+              </a:effectLst>
+            </a:endParaRPr>
+          </a:p>
+          <a:p>
+            <a:pPr lvl="2"/>
+            <a:r>
+              <a:rPr lang="es-ES" dirty="0">
+                <a:solidFill>
+                  <a:schemeClr val="bg1">
+                    <a:lumMod val="95000"/>
+                  </a:schemeClr>
+                </a:solidFill>
+                <a:effectLst>
+                  <a:outerShdw blurRad="38100" dist="38100" dir="2700000" algn="tl">
+                    <a:srgbClr val="000000">
+                      <a:alpha val="43137"/>
+                    </a:srgbClr>
+                  </a:outerShdw>
+                </a:effectLst>
+              </a:rPr>
+              <a:t>p - </a:t>
+            </a:r>
+            <a:r>
+              <a:rPr lang="es-ES" dirty="0" err="1">
+                <a:solidFill>
+                  <a:schemeClr val="bg1">
+                    <a:lumMod val="95000"/>
+                  </a:schemeClr>
+                </a:solidFill>
+                <a:effectLst>
+                  <a:outerShdw blurRad="38100" dist="38100" dir="2700000" algn="tl">
+                    <a:srgbClr val="000000">
+                      <a:alpha val="43137"/>
+                    </a:srgbClr>
+                  </a:outerShdw>
+                </a:effectLst>
+              </a:rPr>
+              <a:t>blockquote</a:t>
+            </a:r>
+            <a:endParaRPr lang="es-ES" dirty="0">
+              <a:solidFill>
+                <a:schemeClr val="bg1">
+                  <a:lumMod val="95000"/>
+                </a:schemeClr>
+              </a:solidFill>
+              <a:effectLst>
+                <a:outerShdw blurRad="38100" dist="38100" dir="2700000" algn="tl">
+                  <a:srgbClr val="000000">
+                    <a:alpha val="43137"/>
+                  </a:srgbClr>
+                </a:outerShdw>
+              </a:effectLst>
+            </a:endParaRPr>
+          </a:p>
         </p:txBody>
       </p:sp>
     </p:spTree>
     <p:extLst>
       <p:ext uri="{BB962C8B-B14F-4D97-AF65-F5344CB8AC3E}">
-        <p14:creationId xmlns:p14="http://schemas.microsoft.com/office/powerpoint/2010/main" val="3018493812"/>
+        <p14:creationId xmlns:p14="http://schemas.microsoft.com/office/powerpoint/2010/main" val="1739376373"/>
       </p:ext>
     </p:extLst>
   </p:cSld>
@@ -4979,10 +5870,571 @@
           <a:chExt cx="0" cy="0"/>
         </a:xfrm>
       </p:grpSpPr>
+      <p:sp>
+        <p:nvSpPr>
+          <p:cNvPr id="2" name="Título 1">
+            <a:extLst>
+              <a:ext uri="{FF2B5EF4-FFF2-40B4-BE49-F238E27FC236}">
+                <a16:creationId xmlns:a16="http://schemas.microsoft.com/office/drawing/2014/main" id="{992FE583-AB43-479D-9DC5-9C5A14E8F6AC}"/>
+              </a:ext>
+            </a:extLst>
+          </p:cNvPr>
+          <p:cNvSpPr>
+            <a:spLocks noGrp="1"/>
+          </p:cNvSpPr>
+          <p:nvPr>
+            <p:ph type="title"/>
+          </p:nvPr>
+        </p:nvSpPr>
+        <p:spPr/>
+        <p:txBody>
+          <a:bodyPr/>
+          <a:lstStyle/>
+          <a:p>
+            <a:r>
+              <a:rPr lang="es-ES" b="1" dirty="0">
+                <a:solidFill>
+                  <a:schemeClr val="accent6">
+                    <a:lumMod val="75000"/>
+                  </a:schemeClr>
+                </a:solidFill>
+                <a:effectLst>
+                  <a:outerShdw blurRad="38100" dist="38100" dir="2700000" algn="tl">
+                    <a:srgbClr val="000000">
+                      <a:alpha val="43137"/>
+                    </a:srgbClr>
+                  </a:outerShdw>
+                </a:effectLst>
+              </a:rPr>
+              <a:t>Enlaces			Imágenes</a:t>
+            </a:r>
+          </a:p>
+        </p:txBody>
+      </p:sp>
+      <p:sp>
+        <p:nvSpPr>
+          <p:cNvPr id="4" name="Marcador de contenido 3">
+            <a:extLst>
+              <a:ext uri="{FF2B5EF4-FFF2-40B4-BE49-F238E27FC236}">
+                <a16:creationId xmlns:a16="http://schemas.microsoft.com/office/drawing/2014/main" id="{A724E4FA-29C1-449A-9BEC-41D0CA72CBD6}"/>
+              </a:ext>
+            </a:extLst>
+          </p:cNvPr>
+          <p:cNvSpPr>
+            <a:spLocks noGrp="1"/>
+          </p:cNvSpPr>
+          <p:nvPr>
+            <p:ph sz="half" idx="1"/>
+          </p:nvPr>
+        </p:nvSpPr>
+        <p:spPr>
+          <a:xfrm>
+            <a:off x="457200" y="1600200"/>
+            <a:ext cx="4038600" cy="2332856"/>
+          </a:xfrm>
+        </p:spPr>
+        <p:txBody>
+          <a:bodyPr>
+            <a:normAutofit/>
+          </a:bodyPr>
+          <a:lstStyle/>
+          <a:p>
+            <a:r>
+              <a:rPr lang="es-ES" dirty="0">
+                <a:solidFill>
+                  <a:srgbClr val="FFFF00"/>
+                </a:solidFill>
+                <a:effectLst>
+                  <a:outerShdw blurRad="38100" dist="38100" dir="2700000" algn="tl">
+                    <a:srgbClr val="000000">
+                      <a:alpha val="43137"/>
+                    </a:srgbClr>
+                  </a:outerShdw>
+                </a:effectLst>
+              </a:rPr>
+              <a:t>a</a:t>
+            </a:r>
+            <a:r>
+              <a:rPr lang="es-ES" dirty="0">
+                <a:solidFill>
+                  <a:schemeClr val="bg1">
+                    <a:lumMod val="95000"/>
+                  </a:schemeClr>
+                </a:solidFill>
+                <a:effectLst>
+                  <a:outerShdw blurRad="38100" dist="38100" dir="2700000" algn="tl">
+                    <a:srgbClr val="000000">
+                      <a:alpha val="43137"/>
+                    </a:srgbClr>
+                  </a:outerShdw>
+                </a:effectLst>
+              </a:rPr>
+              <a:t> = crea un enlace</a:t>
+            </a:r>
+          </a:p>
+          <a:p>
+            <a:pPr lvl="1"/>
+            <a:r>
+              <a:rPr lang="es-ES" dirty="0" err="1">
+                <a:solidFill>
+                  <a:schemeClr val="bg1">
+                    <a:lumMod val="95000"/>
+                  </a:schemeClr>
+                </a:solidFill>
+                <a:effectLst>
+                  <a:outerShdw blurRad="38100" dist="38100" dir="2700000" algn="tl">
+                    <a:srgbClr val="000000">
+                      <a:alpha val="43137"/>
+                    </a:srgbClr>
+                  </a:outerShdw>
+                </a:effectLst>
+              </a:rPr>
+              <a:t>href</a:t>
+            </a:r>
+            <a:r>
+              <a:rPr lang="es-ES" dirty="0">
+                <a:solidFill>
+                  <a:schemeClr val="bg1">
+                    <a:lumMod val="95000"/>
+                  </a:schemeClr>
+                </a:solidFill>
+                <a:effectLst>
+                  <a:outerShdw blurRad="38100" dist="38100" dir="2700000" algn="tl">
+                    <a:srgbClr val="000000">
+                      <a:alpha val="43137"/>
+                    </a:srgbClr>
+                  </a:outerShdw>
+                </a:effectLst>
+              </a:rPr>
+              <a:t> = especifica la </a:t>
+            </a:r>
+            <a:r>
+              <a:rPr lang="es-ES" dirty="0" err="1">
+                <a:solidFill>
+                  <a:schemeClr val="bg1">
+                    <a:lumMod val="95000"/>
+                  </a:schemeClr>
+                </a:solidFill>
+                <a:effectLst>
+                  <a:outerShdw blurRad="38100" dist="38100" dir="2700000" algn="tl">
+                    <a:srgbClr val="000000">
+                      <a:alpha val="43137"/>
+                    </a:srgbClr>
+                  </a:outerShdw>
+                </a:effectLst>
+              </a:rPr>
+              <a:t>url</a:t>
+            </a:r>
+            <a:endParaRPr lang="es-ES" dirty="0">
+              <a:solidFill>
+                <a:schemeClr val="bg1">
+                  <a:lumMod val="95000"/>
+                </a:schemeClr>
+              </a:solidFill>
+              <a:effectLst>
+                <a:outerShdw blurRad="38100" dist="38100" dir="2700000" algn="tl">
+                  <a:srgbClr val="000000">
+                    <a:alpha val="43137"/>
+                  </a:srgbClr>
+                </a:outerShdw>
+              </a:effectLst>
+            </a:endParaRPr>
+          </a:p>
+          <a:p>
+            <a:pPr lvl="1"/>
+            <a:r>
+              <a:rPr lang="es-ES" dirty="0">
+                <a:solidFill>
+                  <a:schemeClr val="bg1">
+                    <a:lumMod val="95000"/>
+                  </a:schemeClr>
+                </a:solidFill>
+                <a:effectLst>
+                  <a:outerShdw blurRad="38100" dist="38100" dir="2700000" algn="tl">
+                    <a:srgbClr val="000000">
+                      <a:alpha val="43137"/>
+                    </a:srgbClr>
+                  </a:outerShdw>
+                </a:effectLst>
+              </a:rPr>
+              <a:t>target = destino del documento</a:t>
+            </a:r>
+          </a:p>
+          <a:p>
+            <a:pPr lvl="1"/>
+            <a:r>
+              <a:rPr lang="es-ES" dirty="0" err="1">
+                <a:solidFill>
+                  <a:schemeClr val="bg1">
+                    <a:lumMod val="95000"/>
+                  </a:schemeClr>
+                </a:solidFill>
+                <a:effectLst>
+                  <a:outerShdw blurRad="38100" dist="38100" dir="2700000" algn="tl">
+                    <a:srgbClr val="000000">
+                      <a:alpha val="43137"/>
+                    </a:srgbClr>
+                  </a:outerShdw>
+                </a:effectLst>
+              </a:rPr>
+              <a:t>download</a:t>
+            </a:r>
+            <a:endParaRPr lang="es-ES" dirty="0">
+              <a:solidFill>
+                <a:schemeClr val="bg1">
+                  <a:lumMod val="95000"/>
+                </a:schemeClr>
+              </a:solidFill>
+              <a:effectLst>
+                <a:outerShdw blurRad="38100" dist="38100" dir="2700000" algn="tl">
+                  <a:srgbClr val="000000">
+                    <a:alpha val="43137"/>
+                  </a:srgbClr>
+                </a:outerShdw>
+              </a:effectLst>
+            </a:endParaRPr>
+          </a:p>
+        </p:txBody>
+      </p:sp>
+      <p:sp>
+        <p:nvSpPr>
+          <p:cNvPr id="5" name="Marcador de contenido 4">
+            <a:extLst>
+              <a:ext uri="{FF2B5EF4-FFF2-40B4-BE49-F238E27FC236}">
+                <a16:creationId xmlns:a16="http://schemas.microsoft.com/office/drawing/2014/main" id="{B9A802B3-F0E8-4363-9FEF-BD5CF12E5181}"/>
+              </a:ext>
+            </a:extLst>
+          </p:cNvPr>
+          <p:cNvSpPr>
+            <a:spLocks noGrp="1"/>
+          </p:cNvSpPr>
+          <p:nvPr>
+            <p:ph sz="half" idx="2"/>
+          </p:nvPr>
+        </p:nvSpPr>
+        <p:spPr>
+          <a:xfrm>
+            <a:off x="4648200" y="1600200"/>
+            <a:ext cx="4038600" cy="4983162"/>
+          </a:xfrm>
+        </p:spPr>
+        <p:txBody>
+          <a:bodyPr>
+            <a:normAutofit/>
+          </a:bodyPr>
+          <a:lstStyle/>
+          <a:p>
+            <a:r>
+              <a:rPr lang="es-ES" dirty="0" err="1">
+                <a:solidFill>
+                  <a:srgbClr val="FFFF00"/>
+                </a:solidFill>
+                <a:effectLst>
+                  <a:outerShdw blurRad="38100" dist="38100" dir="2700000" algn="tl">
+                    <a:srgbClr val="000000">
+                      <a:alpha val="43137"/>
+                    </a:srgbClr>
+                  </a:outerShdw>
+                </a:effectLst>
+              </a:rPr>
+              <a:t>img</a:t>
+            </a:r>
+            <a:r>
+              <a:rPr lang="es-ES" dirty="0">
+                <a:solidFill>
+                  <a:schemeClr val="bg1">
+                    <a:lumMod val="95000"/>
+                  </a:schemeClr>
+                </a:solidFill>
+                <a:effectLst>
+                  <a:outerShdw blurRad="38100" dist="38100" dir="2700000" algn="tl">
+                    <a:srgbClr val="000000">
+                      <a:alpha val="43137"/>
+                    </a:srgbClr>
+                  </a:outerShdw>
+                </a:effectLst>
+              </a:rPr>
+              <a:t> = inserta imagen</a:t>
+            </a:r>
+          </a:p>
+          <a:p>
+            <a:pPr lvl="1"/>
+            <a:r>
+              <a:rPr lang="es-ES" dirty="0" err="1">
+                <a:solidFill>
+                  <a:schemeClr val="bg1">
+                    <a:lumMod val="95000"/>
+                  </a:schemeClr>
+                </a:solidFill>
+                <a:effectLst>
+                  <a:outerShdw blurRad="38100" dist="38100" dir="2700000" algn="tl">
+                    <a:srgbClr val="000000">
+                      <a:alpha val="43137"/>
+                    </a:srgbClr>
+                  </a:outerShdw>
+                </a:effectLst>
+              </a:rPr>
+              <a:t>src</a:t>
+            </a:r>
+            <a:endParaRPr lang="es-ES" dirty="0">
+              <a:solidFill>
+                <a:schemeClr val="bg1">
+                  <a:lumMod val="95000"/>
+                </a:schemeClr>
+              </a:solidFill>
+              <a:effectLst>
+                <a:outerShdw blurRad="38100" dist="38100" dir="2700000" algn="tl">
+                  <a:srgbClr val="000000">
+                    <a:alpha val="43137"/>
+                  </a:srgbClr>
+                </a:outerShdw>
+              </a:effectLst>
+            </a:endParaRPr>
+          </a:p>
+          <a:p>
+            <a:pPr lvl="1"/>
+            <a:r>
+              <a:rPr lang="es-ES" dirty="0" err="1">
+                <a:solidFill>
+                  <a:schemeClr val="bg1">
+                    <a:lumMod val="95000"/>
+                  </a:schemeClr>
+                </a:solidFill>
+                <a:effectLst>
+                  <a:outerShdw blurRad="38100" dist="38100" dir="2700000" algn="tl">
+                    <a:srgbClr val="000000">
+                      <a:alpha val="43137"/>
+                    </a:srgbClr>
+                  </a:outerShdw>
+                </a:effectLst>
+              </a:rPr>
+              <a:t>width</a:t>
+            </a:r>
+            <a:r>
+              <a:rPr lang="es-ES" dirty="0">
+                <a:solidFill>
+                  <a:schemeClr val="bg1">
+                    <a:lumMod val="95000"/>
+                  </a:schemeClr>
+                </a:solidFill>
+                <a:effectLst>
+                  <a:outerShdw blurRad="38100" dist="38100" dir="2700000" algn="tl">
+                    <a:srgbClr val="000000">
+                      <a:alpha val="43137"/>
+                    </a:srgbClr>
+                  </a:outerShdw>
+                </a:effectLst>
+              </a:rPr>
+              <a:t>, </a:t>
+            </a:r>
+            <a:r>
+              <a:rPr lang="es-ES" dirty="0" err="1">
+                <a:solidFill>
+                  <a:schemeClr val="bg1">
+                    <a:lumMod val="95000"/>
+                  </a:schemeClr>
+                </a:solidFill>
+                <a:effectLst>
+                  <a:outerShdw blurRad="38100" dist="38100" dir="2700000" algn="tl">
+                    <a:srgbClr val="000000">
+                      <a:alpha val="43137"/>
+                    </a:srgbClr>
+                  </a:outerShdw>
+                </a:effectLst>
+              </a:rPr>
+              <a:t>height</a:t>
+            </a:r>
+            <a:r>
+              <a:rPr lang="es-ES" dirty="0">
+                <a:solidFill>
+                  <a:schemeClr val="bg1">
+                    <a:lumMod val="95000"/>
+                  </a:schemeClr>
+                </a:solidFill>
+                <a:effectLst>
+                  <a:outerShdw blurRad="38100" dist="38100" dir="2700000" algn="tl">
+                    <a:srgbClr val="000000">
+                      <a:alpha val="43137"/>
+                    </a:srgbClr>
+                  </a:outerShdw>
+                </a:effectLst>
+              </a:rPr>
+              <a:t>, </a:t>
+            </a:r>
+            <a:r>
+              <a:rPr lang="es-ES" dirty="0" err="1">
+                <a:solidFill>
+                  <a:schemeClr val="bg1">
+                    <a:lumMod val="95000"/>
+                  </a:schemeClr>
+                </a:solidFill>
+                <a:effectLst>
+                  <a:outerShdw blurRad="38100" dist="38100" dir="2700000" algn="tl">
+                    <a:srgbClr val="000000">
+                      <a:alpha val="43137"/>
+                    </a:srgbClr>
+                  </a:outerShdw>
+                </a:effectLst>
+              </a:rPr>
+              <a:t>alt</a:t>
+            </a:r>
+            <a:endParaRPr lang="es-ES" dirty="0">
+              <a:solidFill>
+                <a:schemeClr val="bg1">
+                  <a:lumMod val="95000"/>
+                </a:schemeClr>
+              </a:solidFill>
+              <a:effectLst>
+                <a:outerShdw blurRad="38100" dist="38100" dir="2700000" algn="tl">
+                  <a:srgbClr val="000000">
+                    <a:alpha val="43137"/>
+                  </a:srgbClr>
+                </a:outerShdw>
+              </a:effectLst>
+            </a:endParaRPr>
+          </a:p>
+          <a:p>
+            <a:r>
+              <a:rPr lang="es-ES" dirty="0" err="1">
+                <a:solidFill>
+                  <a:srgbClr val="FFFF00"/>
+                </a:solidFill>
+                <a:effectLst>
+                  <a:outerShdw blurRad="38100" dist="38100" dir="2700000" algn="tl">
+                    <a:srgbClr val="000000">
+                      <a:alpha val="43137"/>
+                    </a:srgbClr>
+                  </a:outerShdw>
+                </a:effectLst>
+              </a:rPr>
+              <a:t>picture</a:t>
+            </a:r>
+            <a:r>
+              <a:rPr lang="es-ES" dirty="0">
+                <a:solidFill>
+                  <a:schemeClr val="bg1">
+                    <a:lumMod val="95000"/>
+                  </a:schemeClr>
+                </a:solidFill>
+                <a:effectLst>
+                  <a:outerShdw blurRad="38100" dist="38100" dir="2700000" algn="tl">
+                    <a:srgbClr val="000000">
+                      <a:alpha val="43137"/>
+                    </a:srgbClr>
+                  </a:outerShdw>
+                </a:effectLst>
+              </a:rPr>
+              <a:t> = inserta imagen</a:t>
+            </a:r>
+          </a:p>
+          <a:p>
+            <a:pPr lvl="1"/>
+            <a:r>
+              <a:rPr lang="es-ES" dirty="0" err="1">
+                <a:solidFill>
+                  <a:schemeClr val="bg1">
+                    <a:lumMod val="95000"/>
+                  </a:schemeClr>
+                </a:solidFill>
+                <a:effectLst>
+                  <a:outerShdw blurRad="38100" dist="38100" dir="2700000" algn="tl">
+                    <a:srgbClr val="000000">
+                      <a:alpha val="43137"/>
+                    </a:srgbClr>
+                  </a:outerShdw>
+                </a:effectLst>
+              </a:rPr>
+              <a:t>source</a:t>
+            </a:r>
+            <a:endParaRPr lang="es-ES" dirty="0">
+              <a:solidFill>
+                <a:schemeClr val="bg1">
+                  <a:lumMod val="95000"/>
+                </a:schemeClr>
+              </a:solidFill>
+              <a:effectLst>
+                <a:outerShdw blurRad="38100" dist="38100" dir="2700000" algn="tl">
+                  <a:srgbClr val="000000">
+                    <a:alpha val="43137"/>
+                  </a:srgbClr>
+                </a:outerShdw>
+              </a:effectLst>
+            </a:endParaRPr>
+          </a:p>
+          <a:p>
+            <a:r>
+              <a:rPr lang="es-ES" dirty="0">
+                <a:solidFill>
+                  <a:srgbClr val="FFFF00"/>
+                </a:solidFill>
+                <a:effectLst>
+                  <a:outerShdw blurRad="38100" dist="38100" dir="2700000" algn="tl">
+                    <a:srgbClr val="000000">
+                      <a:alpha val="43137"/>
+                    </a:srgbClr>
+                  </a:outerShdw>
+                </a:effectLst>
+              </a:rPr>
+              <a:t>figure</a:t>
+            </a:r>
+            <a:r>
+              <a:rPr lang="es-ES" dirty="0">
+                <a:solidFill>
+                  <a:schemeClr val="bg1">
+                    <a:lumMod val="95000"/>
+                  </a:schemeClr>
+                </a:solidFill>
+                <a:effectLst>
+                  <a:outerShdw blurRad="38100" dist="38100" dir="2700000" algn="tl">
+                    <a:srgbClr val="000000">
+                      <a:alpha val="43137"/>
+                    </a:srgbClr>
+                  </a:outerShdw>
+                </a:effectLst>
+              </a:rPr>
+              <a:t> = contenido asociado</a:t>
+            </a:r>
+          </a:p>
+          <a:p>
+            <a:r>
+              <a:rPr lang="es-ES" dirty="0" err="1">
+                <a:solidFill>
+                  <a:srgbClr val="FFFF00"/>
+                </a:solidFill>
+                <a:effectLst>
+                  <a:outerShdw blurRad="38100" dist="38100" dir="2700000" algn="tl">
+                    <a:srgbClr val="000000">
+                      <a:alpha val="43137"/>
+                    </a:srgbClr>
+                  </a:outerShdw>
+                </a:effectLst>
+              </a:rPr>
+              <a:t>figcaption</a:t>
+            </a:r>
+            <a:r>
+              <a:rPr lang="es-ES" dirty="0">
+                <a:solidFill>
+                  <a:schemeClr val="bg1">
+                    <a:lumMod val="95000"/>
+                  </a:schemeClr>
+                </a:solidFill>
+                <a:effectLst>
+                  <a:outerShdw blurRad="38100" dist="38100" dir="2700000" algn="tl">
+                    <a:srgbClr val="000000">
+                      <a:alpha val="43137"/>
+                    </a:srgbClr>
+                  </a:outerShdw>
+                </a:effectLst>
+              </a:rPr>
+              <a:t> = titulo del elemento</a:t>
+            </a:r>
+          </a:p>
+        </p:txBody>
+      </p:sp>
     </p:spTree>
     <p:extLst>
       <p:ext uri="{BB962C8B-B14F-4D97-AF65-F5344CB8AC3E}">
-        <p14:creationId xmlns:p14="http://schemas.microsoft.com/office/powerpoint/2010/main" val="2619659781"/>
+        <p14:creationId xmlns:p14="http://schemas.microsoft.com/office/powerpoint/2010/main" val="875466321"/>
       </p:ext>
     </p:extLst>
   </p:cSld>
@@ -5025,10 +6477,10 @@
       </p:grpSpPr>
       <p:sp>
         <p:nvSpPr>
-          <p:cNvPr id="4" name="Marcador de contenido 3">
+          <p:cNvPr id="2" name="Título 1">
             <a:extLst>
               <a:ext uri="{FF2B5EF4-FFF2-40B4-BE49-F238E27FC236}">
-                <a16:creationId xmlns:a16="http://schemas.microsoft.com/office/drawing/2014/main" id="{A724E4FA-29C1-449A-9BEC-41D0CA72CBD6}"/>
+                <a16:creationId xmlns:a16="http://schemas.microsoft.com/office/drawing/2014/main" id="{992FE583-AB43-479D-9DC5-9C5A14E8F6AC}"/>
               </a:ext>
             </a:extLst>
           </p:cNvPr>
@@ -5036,43 +6488,119 @@
             <a:spLocks noGrp="1"/>
           </p:cNvSpPr>
           <p:nvPr>
-            <p:ph sz="half" idx="1"/>
+            <p:ph type="title"/>
           </p:nvPr>
         </p:nvSpPr>
         <p:spPr>
           <a:xfrm>
-            <a:off x="971600" y="332656"/>
-            <a:ext cx="7488832" cy="6408712"/>
+            <a:off x="7082836" y="0"/>
+            <a:ext cx="2026568" cy="1143000"/>
           </a:xfrm>
         </p:spPr>
         <p:txBody>
-          <a:bodyPr>
-            <a:normAutofit/>
-          </a:bodyPr>
+          <a:bodyPr/>
           <a:lstStyle/>
           <a:p>
-            <a:pPr lvl="1"/>
-            <a:endParaRPr lang="es-ES" dirty="0">
-              <a:solidFill>
-                <a:schemeClr val="bg1">
-                  <a:lumMod val="95000"/>
-                </a:schemeClr>
-              </a:solidFill>
-              <a:effectLst>
-                <a:outerShdw blurRad="38100" dist="38100" dir="2700000" algn="tl">
-                  <a:srgbClr val="000000">
-                    <a:alpha val="43137"/>
-                  </a:srgbClr>
-                </a:outerShdw>
-              </a:effectLst>
-            </a:endParaRPr>
+            <a:pPr algn="l"/>
+            <a:r>
+              <a:rPr lang="es-ES" b="1" dirty="0">
+                <a:solidFill>
+                  <a:schemeClr val="accent6">
+                    <a:lumMod val="75000"/>
+                  </a:schemeClr>
+                </a:solidFill>
+                <a:effectLst>
+                  <a:outerShdw blurRad="38100" dist="38100" dir="2700000" algn="tl">
+                    <a:srgbClr val="000000">
+                      <a:alpha val="43137"/>
+                    </a:srgbClr>
+                  </a:outerShdw>
+                </a:effectLst>
+              </a:rPr>
+              <a:t>Tarea</a:t>
+            </a:r>
+          </a:p>
+        </p:txBody>
+      </p:sp>
+      <p:pic>
+        <p:nvPicPr>
+          <p:cNvPr id="9" name="Marcador de contenido 8">
+            <a:extLst>
+              <a:ext uri="{FF2B5EF4-FFF2-40B4-BE49-F238E27FC236}">
+                <a16:creationId xmlns:a16="http://schemas.microsoft.com/office/drawing/2014/main" id="{917E20DB-CA16-416B-9C62-992EABAB5D16}"/>
+              </a:ext>
+            </a:extLst>
+          </p:cNvPr>
+          <p:cNvPicPr>
+            <a:picLocks noGrp="1" noChangeAspect="1"/>
+          </p:cNvPicPr>
+          <p:nvPr>
+            <p:ph sz="half" idx="1"/>
+          </p:nvPr>
+        </p:nvPicPr>
+        <p:blipFill rotWithShape="1">
+          <a:blip r:embed="rId3"/>
+          <a:srcRect r="56731" b="4892"/>
+          <a:stretch/>
+        </p:blipFill>
+        <p:spPr>
+          <a:xfrm>
+            <a:off x="971600" y="37155"/>
+            <a:ext cx="5544616" cy="6852142"/>
+          </a:xfrm>
+          <a:prstGeom prst="rect">
+            <a:avLst/>
+          </a:prstGeom>
+        </p:spPr>
+      </p:pic>
+      <p:sp>
+        <p:nvSpPr>
+          <p:cNvPr id="10" name="Rectángulo 9">
+            <a:extLst>
+              <a:ext uri="{FF2B5EF4-FFF2-40B4-BE49-F238E27FC236}">
+                <a16:creationId xmlns:a16="http://schemas.microsoft.com/office/drawing/2014/main" id="{E600AFA2-548B-451F-A9EE-85F7435EA8D3}"/>
+              </a:ext>
+            </a:extLst>
+          </p:cNvPr>
+          <p:cNvSpPr/>
+          <p:nvPr/>
+        </p:nvSpPr>
+        <p:spPr>
+          <a:xfrm>
+            <a:off x="3275856" y="404664"/>
+            <a:ext cx="3240360" cy="288032"/>
+          </a:xfrm>
+          <a:prstGeom prst="rect">
+            <a:avLst/>
+          </a:prstGeom>
+        </p:spPr>
+        <p:style>
+          <a:lnRef idx="1">
+            <a:schemeClr val="dk1"/>
+          </a:lnRef>
+          <a:fillRef idx="2">
+            <a:schemeClr val="dk1"/>
+          </a:fillRef>
+          <a:effectRef idx="1">
+            <a:schemeClr val="dk1"/>
+          </a:effectRef>
+          <a:fontRef idx="minor">
+            <a:schemeClr val="dk1"/>
+          </a:fontRef>
+        </p:style>
+        <p:txBody>
+          <a:bodyPr rtlCol="0" anchor="ctr"/>
+          <a:lstStyle/>
+          <a:p>
+            <a:pPr algn="ctr"/>
+            <a:endParaRPr lang="es-ES" dirty="0"/>
           </a:p>
         </p:txBody>
       </p:sp>
     </p:spTree>
     <p:extLst>
       <p:ext uri="{BB962C8B-B14F-4D97-AF65-F5344CB8AC3E}">
-        <p14:creationId xmlns:p14="http://schemas.microsoft.com/office/powerpoint/2010/main" val="1174739781"/>
+        <p14:creationId xmlns:p14="http://schemas.microsoft.com/office/powerpoint/2010/main" val="3252402574"/>
       </p:ext>
     </p:extLst>
   </p:cSld>

</xml_diff>